<commit_message>
edits from fridays session
</commit_message>
<xml_diff>
--- a/resources/gradschool/grad_school_session.pptx
+++ b/resources/gradschool/grad_school_session.pptx
@@ -5,7 +5,7 @@
     <p:sldMasterId id="2147483673" r:id="rId1"/>
   </p:sldMasterIdLst>
   <p:notesMasterIdLst>
-    <p:notesMasterId r:id="rId21"/>
+    <p:notesMasterId r:id="rId22"/>
   </p:notesMasterIdLst>
   <p:sldIdLst>
     <p:sldId id="256" r:id="rId2"/>
@@ -23,10 +23,11 @@
     <p:sldId id="277" r:id="rId14"/>
     <p:sldId id="273" r:id="rId15"/>
     <p:sldId id="260" r:id="rId16"/>
-    <p:sldId id="263" r:id="rId17"/>
-    <p:sldId id="262" r:id="rId18"/>
-    <p:sldId id="271" r:id="rId19"/>
-    <p:sldId id="261" r:id="rId20"/>
+    <p:sldId id="278" r:id="rId17"/>
+    <p:sldId id="263" r:id="rId18"/>
+    <p:sldId id="262" r:id="rId19"/>
+    <p:sldId id="271" r:id="rId20"/>
+    <p:sldId id="261" r:id="rId21"/>
   </p:sldIdLst>
   <p:sldSz cx="12192000" cy="6858000"/>
   <p:notesSz cx="6858000" cy="9144000"/>
@@ -2687,7 +2688,7 @@
         <a:p>
           <a:r>
             <a:rPr lang="en-US" dirty="0"/>
-            <a:t>Scholarship</a:t>
+            <a:t>Program Funding</a:t>
           </a:r>
         </a:p>
       </dgm:t>
@@ -2723,7 +2724,7 @@
         <a:p>
           <a:r>
             <a:rPr lang="en-US" dirty="0"/>
-            <a:t>Research</a:t>
+            <a:t>Research presentations</a:t>
           </a:r>
         </a:p>
       </dgm:t>
@@ -2759,7 +2760,7 @@
         <a:p>
           <a:r>
             <a:rPr lang="en-US" dirty="0"/>
-            <a:t>Graduate School</a:t>
+            <a:t>Potential Programs/Faculty</a:t>
           </a:r>
         </a:p>
       </dgm:t>
@@ -2831,7 +2832,7 @@
         <a:p>
           <a:r>
             <a:rPr lang="en-US" dirty="0"/>
-            <a:t>Research</a:t>
+            <a:t>Personal Statements</a:t>
           </a:r>
         </a:p>
       </dgm:t>
@@ -2867,7 +2868,7 @@
         <a:p>
           <a:r>
             <a:rPr lang="en-US" dirty="0"/>
-            <a:t>Graduate School</a:t>
+            <a:t>LORS</a:t>
           </a:r>
         </a:p>
       </dgm:t>
@@ -2903,7 +2904,7 @@
         <a:p>
           <a:r>
             <a:rPr lang="en-US" dirty="0"/>
-            <a:t>Scholarship</a:t>
+            <a:t>Funding applications</a:t>
           </a:r>
         </a:p>
       </dgm:t>
@@ -2975,7 +2976,7 @@
         <a:p>
           <a:r>
             <a:rPr lang="en-US" dirty="0"/>
-            <a:t>Research</a:t>
+            <a:t>Grad applications</a:t>
           </a:r>
         </a:p>
       </dgm:t>
@@ -3011,7 +3012,7 @@
         <a:p>
           <a:r>
             <a:rPr lang="en-US" dirty="0"/>
-            <a:t>Graduate School</a:t>
+            <a:t>Revise Personal Statements</a:t>
           </a:r>
         </a:p>
       </dgm:t>
@@ -3047,7 +3048,7 @@
         <a:p>
           <a:r>
             <a:rPr lang="en-US" dirty="0"/>
-            <a:t>Scholarship</a:t>
+            <a:t>Scholarships due</a:t>
           </a:r>
         </a:p>
       </dgm:t>
@@ -3119,7 +3120,7 @@
         <a:p>
           <a:r>
             <a:rPr lang="en-US" dirty="0"/>
-            <a:t>Research</a:t>
+            <a:t>Submit grad apps</a:t>
           </a:r>
         </a:p>
       </dgm:t>
@@ -3155,7 +3156,7 @@
         <a:p>
           <a:r>
             <a:rPr lang="en-US" dirty="0"/>
-            <a:t>Graduate School</a:t>
+            <a:t>Contact Faculty</a:t>
           </a:r>
         </a:p>
       </dgm:t>
@@ -3191,7 +3192,7 @@
         <a:p>
           <a:r>
             <a:rPr lang="en-US" dirty="0"/>
-            <a:t>Scholarship</a:t>
+            <a:t>Update LORS</a:t>
           </a:r>
         </a:p>
       </dgm:t>
@@ -3263,7 +3264,7 @@
         <a:p>
           <a:r>
             <a:rPr lang="en-US" dirty="0"/>
-            <a:t>Research</a:t>
+            <a:t>Update Program grades</a:t>
           </a:r>
         </a:p>
       </dgm:t>
@@ -3299,7 +3300,7 @@
         <a:p>
           <a:r>
             <a:rPr lang="en-US" dirty="0"/>
-            <a:t>Graduate School</a:t>
+            <a:t>Update potential faculty</a:t>
           </a:r>
         </a:p>
       </dgm:t>
@@ -3316,42 +3317,6 @@
       </dgm:t>
     </dgm:pt>
     <dgm:pt modelId="{6426EAE3-317C-4F22-AFF4-3CD0354F17AC}" type="sibTrans" cxnId="{34452827-82DA-40A6-898B-7C24B4EE70A4}">
-      <dgm:prSet/>
-      <dgm:spPr/>
-      <dgm:t>
-        <a:bodyPr/>
-        <a:lstStyle/>
-        <a:p>
-          <a:endParaRPr lang="en-US"/>
-        </a:p>
-      </dgm:t>
-    </dgm:pt>
-    <dgm:pt modelId="{6DDE4F54-BA92-4DE7-AF3D-CC8CB9343BE9}">
-      <dgm:prSet phldrT="[Text]"/>
-      <dgm:spPr/>
-      <dgm:t>
-        <a:bodyPr/>
-        <a:lstStyle/>
-        <a:p>
-          <a:r>
-            <a:rPr lang="en-US" dirty="0"/>
-            <a:t>Scholarship</a:t>
-          </a:r>
-        </a:p>
-      </dgm:t>
-    </dgm:pt>
-    <dgm:pt modelId="{0668339A-AC9E-44A6-82C5-EFAEC8983A75}" type="parTrans" cxnId="{7661443C-BC87-4D7A-9F96-865DAAEA0029}">
-      <dgm:prSet/>
-      <dgm:spPr/>
-      <dgm:t>
-        <a:bodyPr/>
-        <a:lstStyle/>
-        <a:p>
-          <a:endParaRPr lang="en-US"/>
-        </a:p>
-      </dgm:t>
-    </dgm:pt>
-    <dgm:pt modelId="{F0821B82-D4A7-42D2-9E84-5EA38EB2B3A7}" type="sibTrans" cxnId="{7661443C-BC87-4D7A-9F96-865DAAEA0029}">
       <dgm:prSet/>
       <dgm:spPr/>
       <dgm:t>
@@ -3389,7 +3354,7 @@
       <dgm:spPr/>
     </dgm:pt>
     <dgm:pt modelId="{A8D8DAF4-DE23-48F1-9EC8-94E017D5F200}" type="pres">
-      <dgm:prSet presAssocID="{B8F6DC01-6095-4B3A-8CD5-D8A013D13B02}" presName="childTextBox" presStyleLbl="fgAccFollowNode1" presStyleIdx="0" presStyleCnt="15">
+      <dgm:prSet presAssocID="{B8F6DC01-6095-4B3A-8CD5-D8A013D13B02}" presName="childTextBox" presStyleLbl="fgAccFollowNode1" presStyleIdx="0" presStyleCnt="14">
         <dgm:presLayoutVars>
           <dgm:bulletEnabled val="1"/>
         </dgm:presLayoutVars>
@@ -3397,15 +3362,7 @@
       <dgm:spPr/>
     </dgm:pt>
     <dgm:pt modelId="{E106C303-1AC8-4377-AC76-BED9B39428A9}" type="pres">
-      <dgm:prSet presAssocID="{EECB68AD-00C0-4821-B436-27ED33E4FAFF}" presName="childTextBox" presStyleLbl="fgAccFollowNode1" presStyleIdx="1" presStyleCnt="15">
-        <dgm:presLayoutVars>
-          <dgm:bulletEnabled val="1"/>
-        </dgm:presLayoutVars>
-      </dgm:prSet>
-      <dgm:spPr/>
-    </dgm:pt>
-    <dgm:pt modelId="{5A9DCAC2-6532-40E5-BD32-9081105CD107}" type="pres">
-      <dgm:prSet presAssocID="{6DDE4F54-BA92-4DE7-AF3D-CC8CB9343BE9}" presName="childTextBox" presStyleLbl="fgAccFollowNode1" presStyleIdx="2" presStyleCnt="15">
+      <dgm:prSet presAssocID="{EECB68AD-00C0-4821-B436-27ED33E4FAFF}" presName="childTextBox" presStyleLbl="fgAccFollowNode1" presStyleIdx="1" presStyleCnt="14">
         <dgm:presLayoutVars>
           <dgm:bulletEnabled val="1"/>
         </dgm:presLayoutVars>
@@ -3433,7 +3390,7 @@
       <dgm:spPr/>
     </dgm:pt>
     <dgm:pt modelId="{4DD24C23-3E94-48CE-B00F-3E3A166700FC}" type="pres">
-      <dgm:prSet presAssocID="{8D79ED27-0555-445D-BB55-DD6BEF69E8C5}" presName="childTextArrow" presStyleLbl="fgAccFollowNode1" presStyleIdx="3" presStyleCnt="15">
+      <dgm:prSet presAssocID="{8D79ED27-0555-445D-BB55-DD6BEF69E8C5}" presName="childTextArrow" presStyleLbl="fgAccFollowNode1" presStyleIdx="2" presStyleCnt="14">
         <dgm:presLayoutVars>
           <dgm:bulletEnabled val="1"/>
         </dgm:presLayoutVars>
@@ -3441,7 +3398,7 @@
       <dgm:spPr/>
     </dgm:pt>
     <dgm:pt modelId="{D4E3FF1F-E99E-4DFC-96A8-E1D6BB580DA2}" type="pres">
-      <dgm:prSet presAssocID="{A21449EE-F777-4462-8167-28904122530D}" presName="childTextArrow" presStyleLbl="fgAccFollowNode1" presStyleIdx="4" presStyleCnt="15">
+      <dgm:prSet presAssocID="{A21449EE-F777-4462-8167-28904122530D}" presName="childTextArrow" presStyleLbl="fgAccFollowNode1" presStyleIdx="3" presStyleCnt="14">
         <dgm:presLayoutVars>
           <dgm:bulletEnabled val="1"/>
         </dgm:presLayoutVars>
@@ -3449,7 +3406,7 @@
       <dgm:spPr/>
     </dgm:pt>
     <dgm:pt modelId="{3EDCFA6E-F34F-4C46-9430-542F37F73268}" type="pres">
-      <dgm:prSet presAssocID="{606201E5-010A-4A7E-9B45-99F451E4FC7C}" presName="childTextArrow" presStyleLbl="fgAccFollowNode1" presStyleIdx="5" presStyleCnt="15">
+      <dgm:prSet presAssocID="{606201E5-010A-4A7E-9B45-99F451E4FC7C}" presName="childTextArrow" presStyleLbl="fgAccFollowNode1" presStyleIdx="4" presStyleCnt="14">
         <dgm:presLayoutVars>
           <dgm:bulletEnabled val="1"/>
         </dgm:presLayoutVars>
@@ -3477,7 +3434,7 @@
       <dgm:spPr/>
     </dgm:pt>
     <dgm:pt modelId="{AD7E398F-7CE3-4FF7-83C0-211FE140AFD1}" type="pres">
-      <dgm:prSet presAssocID="{28A24AB6-D4E5-40D5-8C87-F2B283BD7D23}" presName="childTextArrow" presStyleLbl="fgAccFollowNode1" presStyleIdx="6" presStyleCnt="15">
+      <dgm:prSet presAssocID="{28A24AB6-D4E5-40D5-8C87-F2B283BD7D23}" presName="childTextArrow" presStyleLbl="fgAccFollowNode1" presStyleIdx="5" presStyleCnt="14">
         <dgm:presLayoutVars>
           <dgm:bulletEnabled val="1"/>
         </dgm:presLayoutVars>
@@ -3485,7 +3442,7 @@
       <dgm:spPr/>
     </dgm:pt>
     <dgm:pt modelId="{E1D4B543-76DE-47D3-96B4-9445A940AE5C}" type="pres">
-      <dgm:prSet presAssocID="{72F3F9AE-419B-4110-9BBA-84FE17E549B1}" presName="childTextArrow" presStyleLbl="fgAccFollowNode1" presStyleIdx="7" presStyleCnt="15">
+      <dgm:prSet presAssocID="{72F3F9AE-419B-4110-9BBA-84FE17E549B1}" presName="childTextArrow" presStyleLbl="fgAccFollowNode1" presStyleIdx="6" presStyleCnt="14">
         <dgm:presLayoutVars>
           <dgm:bulletEnabled val="1"/>
         </dgm:presLayoutVars>
@@ -3493,7 +3450,7 @@
       <dgm:spPr/>
     </dgm:pt>
     <dgm:pt modelId="{55002AF1-1E88-41C8-8675-767E9CEE9084}" type="pres">
-      <dgm:prSet presAssocID="{701DDE11-98AB-4EE5-854F-84469F9C7CCB}" presName="childTextArrow" presStyleLbl="fgAccFollowNode1" presStyleIdx="8" presStyleCnt="15">
+      <dgm:prSet presAssocID="{701DDE11-98AB-4EE5-854F-84469F9C7CCB}" presName="childTextArrow" presStyleLbl="fgAccFollowNode1" presStyleIdx="7" presStyleCnt="14">
         <dgm:presLayoutVars>
           <dgm:bulletEnabled val="1"/>
         </dgm:presLayoutVars>
@@ -3521,7 +3478,7 @@
       <dgm:spPr/>
     </dgm:pt>
     <dgm:pt modelId="{1BB9EC77-0076-4C2D-9230-DBB8AF5C28AE}" type="pres">
-      <dgm:prSet presAssocID="{7727F6CE-608D-4156-86CD-E195625F0E7D}" presName="childTextArrow" presStyleLbl="fgAccFollowNode1" presStyleIdx="9" presStyleCnt="15">
+      <dgm:prSet presAssocID="{7727F6CE-608D-4156-86CD-E195625F0E7D}" presName="childTextArrow" presStyleLbl="fgAccFollowNode1" presStyleIdx="8" presStyleCnt="14">
         <dgm:presLayoutVars>
           <dgm:bulletEnabled val="1"/>
         </dgm:presLayoutVars>
@@ -3529,7 +3486,7 @@
       <dgm:spPr/>
     </dgm:pt>
     <dgm:pt modelId="{E485F4F2-1B73-4BA3-B2A0-E905DC845C46}" type="pres">
-      <dgm:prSet presAssocID="{022991A4-9AA8-464F-AF1B-ACE09224B838}" presName="childTextArrow" presStyleLbl="fgAccFollowNode1" presStyleIdx="10" presStyleCnt="15">
+      <dgm:prSet presAssocID="{022991A4-9AA8-464F-AF1B-ACE09224B838}" presName="childTextArrow" presStyleLbl="fgAccFollowNode1" presStyleIdx="9" presStyleCnt="14">
         <dgm:presLayoutVars>
           <dgm:bulletEnabled val="1"/>
         </dgm:presLayoutVars>
@@ -3537,7 +3494,7 @@
       <dgm:spPr/>
     </dgm:pt>
     <dgm:pt modelId="{AF0BFB0D-D058-4C4D-B6C6-C176D1472ECB}" type="pres">
-      <dgm:prSet presAssocID="{FF5650F8-4B18-417C-84A3-15C16759CFF8}" presName="childTextArrow" presStyleLbl="fgAccFollowNode1" presStyleIdx="11" presStyleCnt="15">
+      <dgm:prSet presAssocID="{FF5650F8-4B18-417C-84A3-15C16759CFF8}" presName="childTextArrow" presStyleLbl="fgAccFollowNode1" presStyleIdx="10" presStyleCnt="14">
         <dgm:presLayoutVars>
           <dgm:bulletEnabled val="1"/>
         </dgm:presLayoutVars>
@@ -3565,7 +3522,7 @@
       <dgm:spPr/>
     </dgm:pt>
     <dgm:pt modelId="{047CB326-FA9D-4FF2-B9BA-D9CDDD6842CF}" type="pres">
-      <dgm:prSet presAssocID="{E9E61F06-C450-4732-ABAA-D797A1BDF301}" presName="childTextArrow" presStyleLbl="fgAccFollowNode1" presStyleIdx="12" presStyleCnt="15">
+      <dgm:prSet presAssocID="{E9E61F06-C450-4732-ABAA-D797A1BDF301}" presName="childTextArrow" presStyleLbl="fgAccFollowNode1" presStyleIdx="11" presStyleCnt="14">
         <dgm:presLayoutVars>
           <dgm:bulletEnabled val="1"/>
         </dgm:presLayoutVars>
@@ -3573,7 +3530,7 @@
       <dgm:spPr/>
     </dgm:pt>
     <dgm:pt modelId="{AB54E4C4-BF3C-48E1-B874-00294ABBA625}" type="pres">
-      <dgm:prSet presAssocID="{6DE895ED-6A3A-43E9-8D84-8B6F80B2CDE7}" presName="childTextArrow" presStyleLbl="fgAccFollowNode1" presStyleIdx="13" presStyleCnt="15">
+      <dgm:prSet presAssocID="{6DE895ED-6A3A-43E9-8D84-8B6F80B2CDE7}" presName="childTextArrow" presStyleLbl="fgAccFollowNode1" presStyleIdx="12" presStyleCnt="14">
         <dgm:presLayoutVars>
           <dgm:bulletEnabled val="1"/>
         </dgm:presLayoutVars>
@@ -3581,7 +3538,7 @@
       <dgm:spPr/>
     </dgm:pt>
     <dgm:pt modelId="{47A5116C-0456-4E25-ABC0-9122A779E8F1}" type="pres">
-      <dgm:prSet presAssocID="{D4EEC20B-3533-421A-A356-35D086AE4399}" presName="childTextArrow" presStyleLbl="fgAccFollowNode1" presStyleIdx="14" presStyleCnt="15">
+      <dgm:prSet presAssocID="{D4EEC20B-3533-421A-A356-35D086AE4399}" presName="childTextArrow" presStyleLbl="fgAccFollowNode1" presStyleIdx="13" presStyleCnt="14">
         <dgm:presLayoutVars>
           <dgm:bulletEnabled val="1"/>
         </dgm:presLayoutVars>
@@ -3605,7 +3562,6 @@
     <dgm:cxn modelId="{7CC17B32-C283-46D4-AB5E-E5D6EB7A0347}" srcId="{0E2745F6-527B-4EAF-AE37-41CB855AB6F6}" destId="{28A24AB6-D4E5-40D5-8C87-F2B283BD7D23}" srcOrd="0" destOrd="0" parTransId="{6076769E-6082-4603-B976-BE25BFEF19A5}" sibTransId="{BFA4BBED-A058-4C49-BBF5-DED229F04CF7}"/>
     <dgm:cxn modelId="{DC1AED33-CA9C-493A-BB88-F49A0BB950D2}" type="presOf" srcId="{E9E61F06-C450-4732-ABAA-D797A1BDF301}" destId="{047CB326-FA9D-4FF2-B9BA-D9CDDD6842CF}" srcOrd="0" destOrd="0" presId="urn:microsoft.com/office/officeart/2005/8/layout/process4"/>
     <dgm:cxn modelId="{F67E303B-0C88-41AB-AC5F-ED4773F905F6}" srcId="{163E4E08-F4F5-478C-8E0F-9AA4D87D7D27}" destId="{00DBC296-2BEE-4A87-9A78-5FE972F040C3}" srcOrd="4" destOrd="0" parTransId="{A4C64AA7-62EC-4439-BBBF-9415026485D7}" sibTransId="{DD4ADA03-EE08-44FA-9033-475DF30BE24F}"/>
-    <dgm:cxn modelId="{7661443C-BC87-4D7A-9F96-865DAAEA0029}" srcId="{00DBC296-2BEE-4A87-9A78-5FE972F040C3}" destId="{6DDE4F54-BA92-4DE7-AF3D-CC8CB9343BE9}" srcOrd="2" destOrd="0" parTransId="{0668339A-AC9E-44A6-82C5-EFAEC8983A75}" sibTransId="{F0821B82-D4A7-42D2-9E84-5EA38EB2B3A7}"/>
     <dgm:cxn modelId="{4D2CEA5C-109E-4D00-8460-DE58D27E31D8}" type="presOf" srcId="{1046DBD9-C1F2-4053-99E1-A16F534AC8E8}" destId="{C84DFFEC-849F-40B3-B434-23108268D5C0}" srcOrd="1" destOrd="0" presId="urn:microsoft.com/office/officeart/2005/8/layout/process4"/>
     <dgm:cxn modelId="{C1713344-0CE8-4F59-A5F2-BEDAE4914A4B}" type="presOf" srcId="{0E2745F6-527B-4EAF-AE37-41CB855AB6F6}" destId="{4524FFB4-2911-4339-8C24-64AE07233000}" srcOrd="1" destOrd="0" presId="urn:microsoft.com/office/officeart/2005/8/layout/process4"/>
     <dgm:cxn modelId="{D0D14844-F222-4DD9-B506-77FA234CDB32}" type="presOf" srcId="{D4EEC20B-3533-421A-A356-35D086AE4399}" destId="{47A5116C-0456-4E25-ABC0-9122A779E8F1}" srcOrd="0" destOrd="0" presId="urn:microsoft.com/office/officeart/2005/8/layout/process4"/>
@@ -3621,7 +3577,6 @@
     <dgm:cxn modelId="{31B228AE-C71B-4045-9E1A-208FBB136036}" srcId="{6FECA95B-D92B-467A-8D38-80BAF4C7462C}" destId="{FF5650F8-4B18-417C-84A3-15C16759CFF8}" srcOrd="2" destOrd="0" parTransId="{18494C38-5BAE-40A3-A7A2-8E4ACEC2F123}" sibTransId="{873DFDFD-A787-4000-A751-0DA7B9EB805B}"/>
     <dgm:cxn modelId="{4D6026B0-2D71-4158-9275-2A76D399DEA8}" type="presOf" srcId="{A21801E4-F834-41BA-B27A-7C94712AD577}" destId="{3E56AA61-E887-471E-9F16-6E4E8565519E}" srcOrd="1" destOrd="0" presId="urn:microsoft.com/office/officeart/2005/8/layout/process4"/>
     <dgm:cxn modelId="{F6BE0EB4-F241-4214-B7F8-906AA56E4C34}" type="presOf" srcId="{00DBC296-2BEE-4A87-9A78-5FE972F040C3}" destId="{41533F34-DE04-4D97-AEA1-36915849F84C}" srcOrd="0" destOrd="0" presId="urn:microsoft.com/office/officeart/2005/8/layout/process4"/>
-    <dgm:cxn modelId="{560995B4-6587-4E60-B54A-0A472597F70C}" type="presOf" srcId="{6DDE4F54-BA92-4DE7-AF3D-CC8CB9343BE9}" destId="{5A9DCAC2-6532-40E5-BD32-9081105CD107}" srcOrd="0" destOrd="0" presId="urn:microsoft.com/office/officeart/2005/8/layout/process4"/>
     <dgm:cxn modelId="{64A7D4B6-7C28-4C65-B38F-36C40B913604}" srcId="{6FECA95B-D92B-467A-8D38-80BAF4C7462C}" destId="{022991A4-9AA8-464F-AF1B-ACE09224B838}" srcOrd="1" destOrd="0" parTransId="{C20A6157-E878-41F0-9598-ACCE883429A7}" sibTransId="{2036C221-4FBE-461F-B1F3-95A63E509957}"/>
     <dgm:cxn modelId="{78CE25BA-65EC-400F-8A17-062E10CEF9F9}" type="presOf" srcId="{8D79ED27-0555-445D-BB55-DD6BEF69E8C5}" destId="{4DD24C23-3E94-48CE-B00F-3E3A166700FC}" srcOrd="0" destOrd="0" presId="urn:microsoft.com/office/officeart/2005/8/layout/process4"/>
     <dgm:cxn modelId="{B16AF3BE-3044-4D4F-A116-47F3E75A422D}" srcId="{1046DBD9-C1F2-4053-99E1-A16F534AC8E8}" destId="{A21449EE-F777-4462-8167-28904122530D}" srcOrd="1" destOrd="0" parTransId="{F697C414-FE02-4977-B1B9-761CACB21F04}" sibTransId="{385838DB-8D87-4A2F-947A-3D2A8E99DB3F}"/>
@@ -3642,7 +3597,6 @@
     <dgm:cxn modelId="{FFDC6DD3-4FF7-4752-992A-80422AB3CFEE}" type="presParOf" srcId="{E2818EBE-901B-48ED-9705-92592E008C5C}" destId="{6A6D4BD1-77DC-4BDD-8E7F-7AF80DC4F371}" srcOrd="2" destOrd="0" presId="urn:microsoft.com/office/officeart/2005/8/layout/process4"/>
     <dgm:cxn modelId="{942C2317-F11C-4673-A8D1-B739AB1B6700}" type="presParOf" srcId="{6A6D4BD1-77DC-4BDD-8E7F-7AF80DC4F371}" destId="{A8D8DAF4-DE23-48F1-9EC8-94E017D5F200}" srcOrd="0" destOrd="0" presId="urn:microsoft.com/office/officeart/2005/8/layout/process4"/>
     <dgm:cxn modelId="{83140461-8196-4122-8420-89D8EE3314B1}" type="presParOf" srcId="{6A6D4BD1-77DC-4BDD-8E7F-7AF80DC4F371}" destId="{E106C303-1AC8-4377-AC76-BED9B39428A9}" srcOrd="1" destOrd="0" presId="urn:microsoft.com/office/officeart/2005/8/layout/process4"/>
-    <dgm:cxn modelId="{468BF820-4B78-4EAC-A9A6-772AECCFEB59}" type="presParOf" srcId="{6A6D4BD1-77DC-4BDD-8E7F-7AF80DC4F371}" destId="{5A9DCAC2-6532-40E5-BD32-9081105CD107}" srcOrd="2" destOrd="0" presId="urn:microsoft.com/office/officeart/2005/8/layout/process4"/>
     <dgm:cxn modelId="{D3055C1E-DE5C-4F21-990A-BF630B2D5CF2}" type="presParOf" srcId="{C814C0D6-FF9F-4871-844E-F677E42FFB58}" destId="{4D76E4BC-B99B-4D65-B511-BAE8A2480BA5}" srcOrd="1" destOrd="0" presId="urn:microsoft.com/office/officeart/2005/8/layout/process4"/>
     <dgm:cxn modelId="{252B8FB8-3AFA-4FD4-90ED-3B02AA36501D}" type="presParOf" srcId="{C814C0D6-FF9F-4871-844E-F677E42FFB58}" destId="{1F805228-DE31-4C7E-93EC-0D222BBE7EE8}" srcOrd="2" destOrd="0" presId="urn:microsoft.com/office/officeart/2005/8/layout/process4"/>
     <dgm:cxn modelId="{11C4E460-C00F-46B4-AA28-F2BBC1AD12A9}" type="presParOf" srcId="{1F805228-DE31-4C7E-93EC-0D222BBE7EE8}" destId="{19521329-2F57-408A-879C-F38467EFCEDB}" srcOrd="0" destOrd="0" presId="urn:microsoft.com/office/officeart/2005/8/layout/process4"/>
@@ -5138,8 +5092,8 @@
       </dsp:nvSpPr>
       <dsp:spPr>
         <a:xfrm>
-          <a:off x="2533" y="4654460"/>
-          <a:ext cx="1727738" cy="323646"/>
+          <a:off x="0" y="4654460"/>
+          <a:ext cx="2594141" cy="323646"/>
         </a:xfrm>
         <a:prstGeom prst="rect">
           <a:avLst/>
@@ -5183,12 +5137,12 @@
         <a:fontRef idx="minor"/>
       </dsp:style>
       <dsp:txBody>
-        <a:bodyPr spcFirstLastPara="0" vert="horz" wrap="square" lIns="106680" tIns="19050" rIns="106680" bIns="19050" numCol="1" spcCol="1270" anchor="ctr" anchorCtr="0">
+        <a:bodyPr spcFirstLastPara="0" vert="horz" wrap="square" lIns="71120" tIns="12700" rIns="71120" bIns="12700" numCol="1" spcCol="1270" anchor="ctr" anchorCtr="0">
           <a:noAutofit/>
         </a:bodyPr>
         <a:lstStyle/>
         <a:p>
-          <a:pPr marL="0" lvl="0" indent="0" algn="ctr" defTabSz="666750">
+          <a:pPr marL="0" lvl="0" indent="0" algn="ctr" defTabSz="444500">
             <a:lnSpc>
               <a:spcPct val="90000"/>
             </a:lnSpc>
@@ -5201,14 +5155,14 @@
             <a:buNone/>
           </a:pPr>
           <a:r>
-            <a:rPr lang="en-US" sz="1500" kern="1200" dirty="0"/>
-            <a:t>Research</a:t>
+            <a:rPr lang="en-US" sz="1000" kern="1200" dirty="0"/>
+            <a:t>Update Program grades</a:t>
           </a:r>
         </a:p>
       </dsp:txBody>
       <dsp:txXfrm>
-        <a:off x="2533" y="4654460"/>
-        <a:ext cx="1727738" cy="323646"/>
+        <a:off x="0" y="4654460"/>
+        <a:ext cx="2594141" cy="323646"/>
       </dsp:txXfrm>
     </dsp:sp>
     <dsp:sp modelId="{E106C303-1AC8-4377-AC76-BED9B39428A9}">
@@ -5218,8 +5172,8 @@
       </dsp:nvSpPr>
       <dsp:spPr>
         <a:xfrm>
-          <a:off x="1730272" y="4654460"/>
-          <a:ext cx="1727738" cy="323646"/>
+          <a:off x="2594141" y="4654460"/>
+          <a:ext cx="2594141" cy="323646"/>
         </a:xfrm>
         <a:prstGeom prst="rect">
           <a:avLst/>
@@ -5263,12 +5217,12 @@
         <a:fontRef idx="minor"/>
       </dsp:style>
       <dsp:txBody>
-        <a:bodyPr spcFirstLastPara="0" vert="horz" wrap="square" lIns="106680" tIns="19050" rIns="106680" bIns="19050" numCol="1" spcCol="1270" anchor="ctr" anchorCtr="0">
+        <a:bodyPr spcFirstLastPara="0" vert="horz" wrap="square" lIns="71120" tIns="12700" rIns="71120" bIns="12700" numCol="1" spcCol="1270" anchor="ctr" anchorCtr="0">
           <a:noAutofit/>
         </a:bodyPr>
         <a:lstStyle/>
         <a:p>
-          <a:pPr marL="0" lvl="0" indent="0" algn="ctr" defTabSz="666750">
+          <a:pPr marL="0" lvl="0" indent="0" algn="ctr" defTabSz="444500">
             <a:lnSpc>
               <a:spcPct val="90000"/>
             </a:lnSpc>
@@ -5281,94 +5235,14 @@
             <a:buNone/>
           </a:pPr>
           <a:r>
-            <a:rPr lang="en-US" sz="1500" kern="1200" dirty="0"/>
-            <a:t>Graduate School</a:t>
+            <a:rPr lang="en-US" sz="1000" kern="1200" dirty="0"/>
+            <a:t>Update potential faculty</a:t>
           </a:r>
         </a:p>
       </dsp:txBody>
       <dsp:txXfrm>
-        <a:off x="1730272" y="4654460"/>
-        <a:ext cx="1727738" cy="323646"/>
-      </dsp:txXfrm>
-    </dsp:sp>
-    <dsp:sp modelId="{5A9DCAC2-6532-40E5-BD32-9081105CD107}">
-      <dsp:nvSpPr>
-        <dsp:cNvPr id="0" name=""/>
-        <dsp:cNvSpPr/>
-      </dsp:nvSpPr>
-      <dsp:spPr>
-        <a:xfrm>
-          <a:off x="3458010" y="4654460"/>
-          <a:ext cx="1727738" cy="323646"/>
-        </a:xfrm>
-        <a:prstGeom prst="rect">
-          <a:avLst/>
-        </a:prstGeom>
-        <a:solidFill>
-          <a:schemeClr val="accent4">
-            <a:tint val="40000"/>
-            <a:alpha val="90000"/>
-            <a:hueOff val="0"/>
-            <a:satOff val="0"/>
-            <a:lumOff val="0"/>
-            <a:alphaOff val="0"/>
-          </a:schemeClr>
-        </a:solidFill>
-        <a:ln w="12700" cap="flat" cmpd="sng" algn="ctr">
-          <a:solidFill>
-            <a:schemeClr val="accent4">
-              <a:tint val="40000"/>
-              <a:alpha val="90000"/>
-              <a:hueOff val="0"/>
-              <a:satOff val="0"/>
-              <a:lumOff val="0"/>
-              <a:alphaOff val="0"/>
-            </a:schemeClr>
-          </a:solidFill>
-          <a:prstDash val="solid"/>
-          <a:miter lim="800000"/>
-        </a:ln>
-        <a:effectLst/>
-      </dsp:spPr>
-      <dsp:style>
-        <a:lnRef idx="2">
-          <a:scrgbClr r="0" g="0" b="0"/>
-        </a:lnRef>
-        <a:fillRef idx="1">
-          <a:scrgbClr r="0" g="0" b="0"/>
-        </a:fillRef>
-        <a:effectRef idx="0">
-          <a:scrgbClr r="0" g="0" b="0"/>
-        </a:effectRef>
-        <a:fontRef idx="minor"/>
-      </dsp:style>
-      <dsp:txBody>
-        <a:bodyPr spcFirstLastPara="0" vert="horz" wrap="square" lIns="106680" tIns="19050" rIns="106680" bIns="19050" numCol="1" spcCol="1270" anchor="ctr" anchorCtr="0">
-          <a:noAutofit/>
-        </a:bodyPr>
-        <a:lstStyle/>
-        <a:p>
-          <a:pPr marL="0" lvl="0" indent="0" algn="ctr" defTabSz="666750">
-            <a:lnSpc>
-              <a:spcPct val="90000"/>
-            </a:lnSpc>
-            <a:spcBef>
-              <a:spcPct val="0"/>
-            </a:spcBef>
-            <a:spcAft>
-              <a:spcPct val="35000"/>
-            </a:spcAft>
-            <a:buNone/>
-          </a:pPr>
-          <a:r>
-            <a:rPr lang="en-US" sz="1500" kern="1200" dirty="0"/>
-            <a:t>Scholarship</a:t>
-          </a:r>
-        </a:p>
-      </dsp:txBody>
-      <dsp:txXfrm>
-        <a:off x="3458010" y="4654460"/>
-        <a:ext cx="1727738" cy="323646"/>
+        <a:off x="2594141" y="4654460"/>
+        <a:ext cx="2594141" cy="323646"/>
       </dsp:txXfrm>
     </dsp:sp>
     <dsp:sp modelId="{C84DFFEC-849F-40B3-B434-23108268D5C0}">
@@ -5463,6 +5337,86 @@
           <a:avLst/>
         </a:prstGeom>
         <a:solidFill>
+          <a:schemeClr val="accent4">
+            <a:tint val="40000"/>
+            <a:alpha val="90000"/>
+            <a:hueOff val="0"/>
+            <a:satOff val="0"/>
+            <a:lumOff val="0"/>
+            <a:alphaOff val="0"/>
+          </a:schemeClr>
+        </a:solidFill>
+        <a:ln w="12700" cap="flat" cmpd="sng" algn="ctr">
+          <a:solidFill>
+            <a:schemeClr val="accent4">
+              <a:tint val="40000"/>
+              <a:alpha val="90000"/>
+              <a:hueOff val="0"/>
+              <a:satOff val="0"/>
+              <a:lumOff val="0"/>
+              <a:alphaOff val="0"/>
+            </a:schemeClr>
+          </a:solidFill>
+          <a:prstDash val="solid"/>
+          <a:miter lim="800000"/>
+        </a:ln>
+        <a:effectLst/>
+      </dsp:spPr>
+      <dsp:style>
+        <a:lnRef idx="2">
+          <a:scrgbClr r="0" g="0" b="0"/>
+        </a:lnRef>
+        <a:fillRef idx="1">
+          <a:scrgbClr r="0" g="0" b="0"/>
+        </a:fillRef>
+        <a:effectRef idx="0">
+          <a:scrgbClr r="0" g="0" b="0"/>
+        </a:effectRef>
+        <a:fontRef idx="minor"/>
+      </dsp:style>
+      <dsp:txBody>
+        <a:bodyPr spcFirstLastPara="0" vert="horz" wrap="square" lIns="71120" tIns="12700" rIns="71120" bIns="12700" numCol="1" spcCol="1270" anchor="ctr" anchorCtr="0">
+          <a:noAutofit/>
+        </a:bodyPr>
+        <a:lstStyle/>
+        <a:p>
+          <a:pPr marL="0" lvl="0" indent="0" algn="ctr" defTabSz="444500">
+            <a:lnSpc>
+              <a:spcPct val="90000"/>
+            </a:lnSpc>
+            <a:spcBef>
+              <a:spcPct val="0"/>
+            </a:spcBef>
+            <a:spcAft>
+              <a:spcPct val="35000"/>
+            </a:spcAft>
+            <a:buNone/>
+          </a:pPr>
+          <a:r>
+            <a:rPr lang="en-US" sz="1000" kern="1200" dirty="0"/>
+            <a:t>Submit grad apps</a:t>
+          </a:r>
+        </a:p>
+      </dsp:txBody>
+      <dsp:txXfrm>
+        <a:off x="2533" y="3596865"/>
+        <a:ext cx="1727738" cy="323549"/>
+      </dsp:txXfrm>
+    </dsp:sp>
+    <dsp:sp modelId="{D4E3FF1F-E99E-4DFC-96A8-E1D6BB580DA2}">
+      <dsp:nvSpPr>
+        <dsp:cNvPr id="0" name=""/>
+        <dsp:cNvSpPr/>
+      </dsp:nvSpPr>
+      <dsp:spPr>
+        <a:xfrm>
+          <a:off x="1730272" y="3596865"/>
+          <a:ext cx="1727738" cy="323549"/>
+        </a:xfrm>
+        <a:prstGeom prst="rect">
+          <a:avLst/>
+        </a:prstGeom>
+        <a:solidFill>
           <a:schemeClr val="accent5">
             <a:tint val="40000"/>
             <a:alpha val="90000"/>
@@ -5501,12 +5455,12 @@
         <a:fontRef idx="minor"/>
       </dsp:style>
       <dsp:txBody>
-        <a:bodyPr spcFirstLastPara="0" vert="horz" wrap="square" lIns="106680" tIns="19050" rIns="106680" bIns="19050" numCol="1" spcCol="1270" anchor="ctr" anchorCtr="0">
+        <a:bodyPr spcFirstLastPara="0" vert="horz" wrap="square" lIns="71120" tIns="12700" rIns="71120" bIns="12700" numCol="1" spcCol="1270" anchor="ctr" anchorCtr="0">
           <a:noAutofit/>
         </a:bodyPr>
         <a:lstStyle/>
         <a:p>
-          <a:pPr marL="0" lvl="0" indent="0" algn="ctr" defTabSz="666750">
+          <a:pPr marL="0" lvl="0" indent="0" algn="ctr" defTabSz="444500">
             <a:lnSpc>
               <a:spcPct val="90000"/>
             </a:lnSpc>
@@ -5519,24 +5473,24 @@
             <a:buNone/>
           </a:pPr>
           <a:r>
-            <a:rPr lang="en-US" sz="1500" kern="1200" dirty="0"/>
-            <a:t>Research</a:t>
+            <a:rPr lang="en-US" sz="1000" kern="1200" dirty="0"/>
+            <a:t>Contact Faculty</a:t>
           </a:r>
         </a:p>
       </dsp:txBody>
       <dsp:txXfrm>
-        <a:off x="2533" y="3596865"/>
+        <a:off x="1730272" y="3596865"/>
         <a:ext cx="1727738" cy="323549"/>
       </dsp:txXfrm>
     </dsp:sp>
-    <dsp:sp modelId="{D4E3FF1F-E99E-4DFC-96A8-E1D6BB580DA2}">
+    <dsp:sp modelId="{3EDCFA6E-F34F-4C46-9430-542F37F73268}">
       <dsp:nvSpPr>
         <dsp:cNvPr id="0" name=""/>
         <dsp:cNvSpPr/>
       </dsp:nvSpPr>
       <dsp:spPr>
         <a:xfrm>
-          <a:off x="1730272" y="3596865"/>
+          <a:off x="3458010" y="3596865"/>
           <a:ext cx="1727738" cy="323549"/>
         </a:xfrm>
         <a:prstGeom prst="rect">
@@ -5581,12 +5535,12 @@
         <a:fontRef idx="minor"/>
       </dsp:style>
       <dsp:txBody>
-        <a:bodyPr spcFirstLastPara="0" vert="horz" wrap="square" lIns="106680" tIns="19050" rIns="106680" bIns="19050" numCol="1" spcCol="1270" anchor="ctr" anchorCtr="0">
+        <a:bodyPr spcFirstLastPara="0" vert="horz" wrap="square" lIns="71120" tIns="12700" rIns="71120" bIns="12700" numCol="1" spcCol="1270" anchor="ctr" anchorCtr="0">
           <a:noAutofit/>
         </a:bodyPr>
         <a:lstStyle/>
         <a:p>
-          <a:pPr marL="0" lvl="0" indent="0" algn="ctr" defTabSz="666750">
+          <a:pPr marL="0" lvl="0" indent="0" algn="ctr" defTabSz="444500">
             <a:lnSpc>
               <a:spcPct val="90000"/>
             </a:lnSpc>
@@ -5599,88 +5553,8 @@
             <a:buNone/>
           </a:pPr>
           <a:r>
-            <a:rPr lang="en-US" sz="1500" kern="1200" dirty="0"/>
-            <a:t>Graduate School</a:t>
-          </a:r>
-        </a:p>
-      </dsp:txBody>
-      <dsp:txXfrm>
-        <a:off x="1730272" y="3596865"/>
-        <a:ext cx="1727738" cy="323549"/>
-      </dsp:txXfrm>
-    </dsp:sp>
-    <dsp:sp modelId="{3EDCFA6E-F34F-4C46-9430-542F37F73268}">
-      <dsp:nvSpPr>
-        <dsp:cNvPr id="0" name=""/>
-        <dsp:cNvSpPr/>
-      </dsp:nvSpPr>
-      <dsp:spPr>
-        <a:xfrm>
-          <a:off x="3458010" y="3596865"/>
-          <a:ext cx="1727738" cy="323549"/>
-        </a:xfrm>
-        <a:prstGeom prst="rect">
-          <a:avLst/>
-        </a:prstGeom>
-        <a:solidFill>
-          <a:schemeClr val="accent2">
-            <a:tint val="40000"/>
-            <a:alpha val="90000"/>
-            <a:hueOff val="0"/>
-            <a:satOff val="0"/>
-            <a:lumOff val="0"/>
-            <a:alphaOff val="0"/>
-          </a:schemeClr>
-        </a:solidFill>
-        <a:ln w="12700" cap="flat" cmpd="sng" algn="ctr">
-          <a:solidFill>
-            <a:schemeClr val="accent2">
-              <a:tint val="40000"/>
-              <a:alpha val="90000"/>
-              <a:hueOff val="0"/>
-              <a:satOff val="0"/>
-              <a:lumOff val="0"/>
-              <a:alphaOff val="0"/>
-            </a:schemeClr>
-          </a:solidFill>
-          <a:prstDash val="solid"/>
-          <a:miter lim="800000"/>
-        </a:ln>
-        <a:effectLst/>
-      </dsp:spPr>
-      <dsp:style>
-        <a:lnRef idx="2">
-          <a:scrgbClr r="0" g="0" b="0"/>
-        </a:lnRef>
-        <a:fillRef idx="1">
-          <a:scrgbClr r="0" g="0" b="0"/>
-        </a:fillRef>
-        <a:effectRef idx="0">
-          <a:scrgbClr r="0" g="0" b="0"/>
-        </a:effectRef>
-        <a:fontRef idx="minor"/>
-      </dsp:style>
-      <dsp:txBody>
-        <a:bodyPr spcFirstLastPara="0" vert="horz" wrap="square" lIns="106680" tIns="19050" rIns="106680" bIns="19050" numCol="1" spcCol="1270" anchor="ctr" anchorCtr="0">
-          <a:noAutofit/>
-        </a:bodyPr>
-        <a:lstStyle/>
-        <a:p>
-          <a:pPr marL="0" lvl="0" indent="0" algn="ctr" defTabSz="666750">
-            <a:lnSpc>
-              <a:spcPct val="90000"/>
-            </a:lnSpc>
-            <a:spcBef>
-              <a:spcPct val="0"/>
-            </a:spcBef>
-            <a:spcAft>
-              <a:spcPct val="35000"/>
-            </a:spcAft>
-            <a:buNone/>
-          </a:pPr>
-          <a:r>
-            <a:rPr lang="en-US" sz="1500" kern="1200" dirty="0"/>
-            <a:t>Scholarship</a:t>
+            <a:rPr lang="en-US" sz="1000" kern="1200" dirty="0"/>
+            <a:t>Update LORS</a:t>
           </a:r>
         </a:p>
       </dsp:txBody>
@@ -5781,6 +5655,86 @@
           <a:avLst/>
         </a:prstGeom>
         <a:solidFill>
+          <a:schemeClr val="accent2">
+            <a:tint val="40000"/>
+            <a:alpha val="90000"/>
+            <a:hueOff val="0"/>
+            <a:satOff val="0"/>
+            <a:lumOff val="0"/>
+            <a:alphaOff val="0"/>
+          </a:schemeClr>
+        </a:solidFill>
+        <a:ln w="12700" cap="flat" cmpd="sng" algn="ctr">
+          <a:solidFill>
+            <a:schemeClr val="accent2">
+              <a:tint val="40000"/>
+              <a:alpha val="90000"/>
+              <a:hueOff val="0"/>
+              <a:satOff val="0"/>
+              <a:lumOff val="0"/>
+              <a:alphaOff val="0"/>
+            </a:schemeClr>
+          </a:solidFill>
+          <a:prstDash val="solid"/>
+          <a:miter lim="800000"/>
+        </a:ln>
+        <a:effectLst/>
+      </dsp:spPr>
+      <dsp:style>
+        <a:lnRef idx="2">
+          <a:scrgbClr r="0" g="0" b="0"/>
+        </a:lnRef>
+        <a:fillRef idx="1">
+          <a:scrgbClr r="0" g="0" b="0"/>
+        </a:fillRef>
+        <a:effectRef idx="0">
+          <a:scrgbClr r="0" g="0" b="0"/>
+        </a:effectRef>
+        <a:fontRef idx="minor"/>
+      </dsp:style>
+      <dsp:txBody>
+        <a:bodyPr spcFirstLastPara="0" vert="horz" wrap="square" lIns="71120" tIns="12700" rIns="71120" bIns="12700" numCol="1" spcCol="1270" anchor="ctr" anchorCtr="0">
+          <a:noAutofit/>
+        </a:bodyPr>
+        <a:lstStyle/>
+        <a:p>
+          <a:pPr marL="0" lvl="0" indent="0" algn="ctr" defTabSz="444500">
+            <a:lnSpc>
+              <a:spcPct val="90000"/>
+            </a:lnSpc>
+            <a:spcBef>
+              <a:spcPct val="0"/>
+            </a:spcBef>
+            <a:spcAft>
+              <a:spcPct val="35000"/>
+            </a:spcAft>
+            <a:buNone/>
+          </a:pPr>
+          <a:r>
+            <a:rPr lang="en-US" sz="1000" kern="1200" dirty="0"/>
+            <a:t>Grad applications</a:t>
+          </a:r>
+        </a:p>
+      </dsp:txBody>
+      <dsp:txXfrm>
+        <a:off x="2533" y="2525312"/>
+        <a:ext cx="1727738" cy="323549"/>
+      </dsp:txXfrm>
+    </dsp:sp>
+    <dsp:sp modelId="{E1D4B543-76DE-47D3-96B4-9445A940AE5C}">
+      <dsp:nvSpPr>
+        <dsp:cNvPr id="0" name=""/>
+        <dsp:cNvSpPr/>
+      </dsp:nvSpPr>
+      <dsp:spPr>
+        <a:xfrm>
+          <a:off x="1730272" y="2525312"/>
+          <a:ext cx="1727738" cy="323549"/>
+        </a:xfrm>
+        <a:prstGeom prst="rect">
+          <a:avLst/>
+        </a:prstGeom>
+        <a:solidFill>
           <a:schemeClr val="accent3">
             <a:tint val="40000"/>
             <a:alpha val="90000"/>
@@ -5819,12 +5773,12 @@
         <a:fontRef idx="minor"/>
       </dsp:style>
       <dsp:txBody>
-        <a:bodyPr spcFirstLastPara="0" vert="horz" wrap="square" lIns="106680" tIns="19050" rIns="106680" bIns="19050" numCol="1" spcCol="1270" anchor="ctr" anchorCtr="0">
+        <a:bodyPr spcFirstLastPara="0" vert="horz" wrap="square" lIns="71120" tIns="12700" rIns="71120" bIns="12700" numCol="1" spcCol="1270" anchor="ctr" anchorCtr="0">
           <a:noAutofit/>
         </a:bodyPr>
         <a:lstStyle/>
         <a:p>
-          <a:pPr marL="0" lvl="0" indent="0" algn="ctr" defTabSz="666750">
+          <a:pPr marL="0" lvl="0" indent="0" algn="ctr" defTabSz="444500">
             <a:lnSpc>
               <a:spcPct val="90000"/>
             </a:lnSpc>
@@ -5837,24 +5791,24 @@
             <a:buNone/>
           </a:pPr>
           <a:r>
-            <a:rPr lang="en-US" sz="1500" kern="1200" dirty="0"/>
-            <a:t>Research</a:t>
+            <a:rPr lang="en-US" sz="1000" kern="1200" dirty="0"/>
+            <a:t>Revise Personal Statements</a:t>
           </a:r>
         </a:p>
       </dsp:txBody>
       <dsp:txXfrm>
-        <a:off x="2533" y="2525312"/>
+        <a:off x="1730272" y="2525312"/>
         <a:ext cx="1727738" cy="323549"/>
       </dsp:txXfrm>
     </dsp:sp>
-    <dsp:sp modelId="{E1D4B543-76DE-47D3-96B4-9445A940AE5C}">
+    <dsp:sp modelId="{55002AF1-1E88-41C8-8675-767E9CEE9084}">
       <dsp:nvSpPr>
         <dsp:cNvPr id="0" name=""/>
         <dsp:cNvSpPr/>
       </dsp:nvSpPr>
       <dsp:spPr>
         <a:xfrm>
-          <a:off x="1730272" y="2525312"/>
+          <a:off x="3458010" y="2525312"/>
           <a:ext cx="1727738" cy="323549"/>
         </a:xfrm>
         <a:prstGeom prst="rect">
@@ -5899,12 +5853,12 @@
         <a:fontRef idx="minor"/>
       </dsp:style>
       <dsp:txBody>
-        <a:bodyPr spcFirstLastPara="0" vert="horz" wrap="square" lIns="106680" tIns="19050" rIns="106680" bIns="19050" numCol="1" spcCol="1270" anchor="ctr" anchorCtr="0">
+        <a:bodyPr spcFirstLastPara="0" vert="horz" wrap="square" lIns="71120" tIns="12700" rIns="71120" bIns="12700" numCol="1" spcCol="1270" anchor="ctr" anchorCtr="0">
           <a:noAutofit/>
         </a:bodyPr>
         <a:lstStyle/>
         <a:p>
-          <a:pPr marL="0" lvl="0" indent="0" algn="ctr" defTabSz="666750">
+          <a:pPr marL="0" lvl="0" indent="0" algn="ctr" defTabSz="444500">
             <a:lnSpc>
               <a:spcPct val="90000"/>
             </a:lnSpc>
@@ -5917,88 +5871,8 @@
             <a:buNone/>
           </a:pPr>
           <a:r>
-            <a:rPr lang="en-US" sz="1500" kern="1200" dirty="0"/>
-            <a:t>Graduate School</a:t>
-          </a:r>
-        </a:p>
-      </dsp:txBody>
-      <dsp:txXfrm>
-        <a:off x="1730272" y="2525312"/>
-        <a:ext cx="1727738" cy="323549"/>
-      </dsp:txXfrm>
-    </dsp:sp>
-    <dsp:sp modelId="{55002AF1-1E88-41C8-8675-767E9CEE9084}">
-      <dsp:nvSpPr>
-        <dsp:cNvPr id="0" name=""/>
-        <dsp:cNvSpPr/>
-      </dsp:nvSpPr>
-      <dsp:spPr>
-        <a:xfrm>
-          <a:off x="3458010" y="2525312"/>
-          <a:ext cx="1727738" cy="323549"/>
-        </a:xfrm>
-        <a:prstGeom prst="rect">
-          <a:avLst/>
-        </a:prstGeom>
-        <a:solidFill>
-          <a:schemeClr val="accent5">
-            <a:tint val="40000"/>
-            <a:alpha val="90000"/>
-            <a:hueOff val="0"/>
-            <a:satOff val="0"/>
-            <a:lumOff val="0"/>
-            <a:alphaOff val="0"/>
-          </a:schemeClr>
-        </a:solidFill>
-        <a:ln w="12700" cap="flat" cmpd="sng" algn="ctr">
-          <a:solidFill>
-            <a:schemeClr val="accent5">
-              <a:tint val="40000"/>
-              <a:alpha val="90000"/>
-              <a:hueOff val="0"/>
-              <a:satOff val="0"/>
-              <a:lumOff val="0"/>
-              <a:alphaOff val="0"/>
-            </a:schemeClr>
-          </a:solidFill>
-          <a:prstDash val="solid"/>
-          <a:miter lim="800000"/>
-        </a:ln>
-        <a:effectLst/>
-      </dsp:spPr>
-      <dsp:style>
-        <a:lnRef idx="2">
-          <a:scrgbClr r="0" g="0" b="0"/>
-        </a:lnRef>
-        <a:fillRef idx="1">
-          <a:scrgbClr r="0" g="0" b="0"/>
-        </a:fillRef>
-        <a:effectRef idx="0">
-          <a:scrgbClr r="0" g="0" b="0"/>
-        </a:effectRef>
-        <a:fontRef idx="minor"/>
-      </dsp:style>
-      <dsp:txBody>
-        <a:bodyPr spcFirstLastPara="0" vert="horz" wrap="square" lIns="106680" tIns="19050" rIns="106680" bIns="19050" numCol="1" spcCol="1270" anchor="ctr" anchorCtr="0">
-          <a:noAutofit/>
-        </a:bodyPr>
-        <a:lstStyle/>
-        <a:p>
-          <a:pPr marL="0" lvl="0" indent="0" algn="ctr" defTabSz="666750">
-            <a:lnSpc>
-              <a:spcPct val="90000"/>
-            </a:lnSpc>
-            <a:spcBef>
-              <a:spcPct val="0"/>
-            </a:spcBef>
-            <a:spcAft>
-              <a:spcPct val="35000"/>
-            </a:spcAft>
-            <a:buNone/>
-          </a:pPr>
-          <a:r>
-            <a:rPr lang="en-US" sz="1500" kern="1200" dirty="0"/>
-            <a:t>Scholarship</a:t>
+            <a:rPr lang="en-US" sz="1000" kern="1200" dirty="0"/>
+            <a:t>Scholarships due</a:t>
           </a:r>
         </a:p>
       </dsp:txBody>
@@ -6099,6 +5973,86 @@
           <a:avLst/>
         </a:prstGeom>
         <a:solidFill>
+          <a:schemeClr val="accent5">
+            <a:tint val="40000"/>
+            <a:alpha val="90000"/>
+            <a:hueOff val="0"/>
+            <a:satOff val="0"/>
+            <a:lumOff val="0"/>
+            <a:alphaOff val="0"/>
+          </a:schemeClr>
+        </a:solidFill>
+        <a:ln w="12700" cap="flat" cmpd="sng" algn="ctr">
+          <a:solidFill>
+            <a:schemeClr val="accent5">
+              <a:tint val="40000"/>
+              <a:alpha val="90000"/>
+              <a:hueOff val="0"/>
+              <a:satOff val="0"/>
+              <a:lumOff val="0"/>
+              <a:alphaOff val="0"/>
+            </a:schemeClr>
+          </a:solidFill>
+          <a:prstDash val="solid"/>
+          <a:miter lim="800000"/>
+        </a:ln>
+        <a:effectLst/>
+      </dsp:spPr>
+      <dsp:style>
+        <a:lnRef idx="2">
+          <a:scrgbClr r="0" g="0" b="0"/>
+        </a:lnRef>
+        <a:fillRef idx="1">
+          <a:scrgbClr r="0" g="0" b="0"/>
+        </a:fillRef>
+        <a:effectRef idx="0">
+          <a:scrgbClr r="0" g="0" b="0"/>
+        </a:effectRef>
+        <a:fontRef idx="minor"/>
+      </dsp:style>
+      <dsp:txBody>
+        <a:bodyPr spcFirstLastPara="0" vert="horz" wrap="square" lIns="71120" tIns="12700" rIns="71120" bIns="12700" numCol="1" spcCol="1270" anchor="ctr" anchorCtr="0">
+          <a:noAutofit/>
+        </a:bodyPr>
+        <a:lstStyle/>
+        <a:p>
+          <a:pPr marL="0" lvl="0" indent="0" algn="ctr" defTabSz="444500">
+            <a:lnSpc>
+              <a:spcPct val="90000"/>
+            </a:lnSpc>
+            <a:spcBef>
+              <a:spcPct val="0"/>
+            </a:spcBef>
+            <a:spcAft>
+              <a:spcPct val="35000"/>
+            </a:spcAft>
+            <a:buNone/>
+          </a:pPr>
+          <a:r>
+            <a:rPr lang="en-US" sz="1000" kern="1200" dirty="0"/>
+            <a:t>Personal Statements</a:t>
+          </a:r>
+        </a:p>
+      </dsp:txBody>
+      <dsp:txXfrm>
+        <a:off x="2533" y="1453759"/>
+        <a:ext cx="1727738" cy="323549"/>
+      </dsp:txXfrm>
+    </dsp:sp>
+    <dsp:sp modelId="{E485F4F2-1B73-4BA3-B2A0-E905DC845C46}">
+      <dsp:nvSpPr>
+        <dsp:cNvPr id="0" name=""/>
+        <dsp:cNvSpPr/>
+      </dsp:nvSpPr>
+      <dsp:spPr>
+        <a:xfrm>
+          <a:off x="1730272" y="1453759"/>
+          <a:ext cx="1727738" cy="323549"/>
+        </a:xfrm>
+        <a:prstGeom prst="rect">
+          <a:avLst/>
+        </a:prstGeom>
+        <a:solidFill>
           <a:schemeClr val="accent6">
             <a:tint val="40000"/>
             <a:alpha val="90000"/>
@@ -6137,12 +6091,12 @@
         <a:fontRef idx="minor"/>
       </dsp:style>
       <dsp:txBody>
-        <a:bodyPr spcFirstLastPara="0" vert="horz" wrap="square" lIns="106680" tIns="19050" rIns="106680" bIns="19050" numCol="1" spcCol="1270" anchor="ctr" anchorCtr="0">
+        <a:bodyPr spcFirstLastPara="0" vert="horz" wrap="square" lIns="71120" tIns="12700" rIns="71120" bIns="12700" numCol="1" spcCol="1270" anchor="ctr" anchorCtr="0">
           <a:noAutofit/>
         </a:bodyPr>
         <a:lstStyle/>
         <a:p>
-          <a:pPr marL="0" lvl="0" indent="0" algn="ctr" defTabSz="666750">
+          <a:pPr marL="0" lvl="0" indent="0" algn="ctr" defTabSz="444500">
             <a:lnSpc>
               <a:spcPct val="90000"/>
             </a:lnSpc>
@@ -6155,24 +6109,24 @@
             <a:buNone/>
           </a:pPr>
           <a:r>
-            <a:rPr lang="en-US" sz="1500" kern="1200" dirty="0"/>
-            <a:t>Research</a:t>
+            <a:rPr lang="en-US" sz="1000" kern="1200" dirty="0"/>
+            <a:t>LORS</a:t>
           </a:r>
         </a:p>
       </dsp:txBody>
       <dsp:txXfrm>
-        <a:off x="2533" y="1453759"/>
+        <a:off x="1730272" y="1453759"/>
         <a:ext cx="1727738" cy="323549"/>
       </dsp:txXfrm>
     </dsp:sp>
-    <dsp:sp modelId="{E485F4F2-1B73-4BA3-B2A0-E905DC845C46}">
+    <dsp:sp modelId="{AF0BFB0D-D058-4C4D-B6C6-C176D1472ECB}">
       <dsp:nvSpPr>
         <dsp:cNvPr id="0" name=""/>
         <dsp:cNvSpPr/>
       </dsp:nvSpPr>
       <dsp:spPr>
         <a:xfrm>
-          <a:off x="1730272" y="1453759"/>
+          <a:off x="3458010" y="1453759"/>
           <a:ext cx="1727738" cy="323549"/>
         </a:xfrm>
         <a:prstGeom prst="rect">
@@ -6217,12 +6171,12 @@
         <a:fontRef idx="minor"/>
       </dsp:style>
       <dsp:txBody>
-        <a:bodyPr spcFirstLastPara="0" vert="horz" wrap="square" lIns="106680" tIns="19050" rIns="106680" bIns="19050" numCol="1" spcCol="1270" anchor="ctr" anchorCtr="0">
+        <a:bodyPr spcFirstLastPara="0" vert="horz" wrap="square" lIns="71120" tIns="12700" rIns="71120" bIns="12700" numCol="1" spcCol="1270" anchor="ctr" anchorCtr="0">
           <a:noAutofit/>
         </a:bodyPr>
         <a:lstStyle/>
         <a:p>
-          <a:pPr marL="0" lvl="0" indent="0" algn="ctr" defTabSz="666750">
+          <a:pPr marL="0" lvl="0" indent="0" algn="ctr" defTabSz="444500">
             <a:lnSpc>
               <a:spcPct val="90000"/>
             </a:lnSpc>
@@ -6235,88 +6189,8 @@
             <a:buNone/>
           </a:pPr>
           <a:r>
-            <a:rPr lang="en-US" sz="1500" kern="1200" dirty="0"/>
-            <a:t>Graduate School</a:t>
-          </a:r>
-        </a:p>
-      </dsp:txBody>
-      <dsp:txXfrm>
-        <a:off x="1730272" y="1453759"/>
-        <a:ext cx="1727738" cy="323549"/>
-      </dsp:txXfrm>
-    </dsp:sp>
-    <dsp:sp modelId="{AF0BFB0D-D058-4C4D-B6C6-C176D1472ECB}">
-      <dsp:nvSpPr>
-        <dsp:cNvPr id="0" name=""/>
-        <dsp:cNvSpPr/>
-      </dsp:nvSpPr>
-      <dsp:spPr>
-        <a:xfrm>
-          <a:off x="3458010" y="1453759"/>
-          <a:ext cx="1727738" cy="323549"/>
-        </a:xfrm>
-        <a:prstGeom prst="rect">
-          <a:avLst/>
-        </a:prstGeom>
-        <a:solidFill>
-          <a:schemeClr val="accent3">
-            <a:tint val="40000"/>
-            <a:alpha val="90000"/>
-            <a:hueOff val="0"/>
-            <a:satOff val="0"/>
-            <a:lumOff val="0"/>
-            <a:alphaOff val="0"/>
-          </a:schemeClr>
-        </a:solidFill>
-        <a:ln w="12700" cap="flat" cmpd="sng" algn="ctr">
-          <a:solidFill>
-            <a:schemeClr val="accent3">
-              <a:tint val="40000"/>
-              <a:alpha val="90000"/>
-              <a:hueOff val="0"/>
-              <a:satOff val="0"/>
-              <a:lumOff val="0"/>
-              <a:alphaOff val="0"/>
-            </a:schemeClr>
-          </a:solidFill>
-          <a:prstDash val="solid"/>
-          <a:miter lim="800000"/>
-        </a:ln>
-        <a:effectLst/>
-      </dsp:spPr>
-      <dsp:style>
-        <a:lnRef idx="2">
-          <a:scrgbClr r="0" g="0" b="0"/>
-        </a:lnRef>
-        <a:fillRef idx="1">
-          <a:scrgbClr r="0" g="0" b="0"/>
-        </a:fillRef>
-        <a:effectRef idx="0">
-          <a:scrgbClr r="0" g="0" b="0"/>
-        </a:effectRef>
-        <a:fontRef idx="minor"/>
-      </dsp:style>
-      <dsp:txBody>
-        <a:bodyPr spcFirstLastPara="0" vert="horz" wrap="square" lIns="106680" tIns="19050" rIns="106680" bIns="19050" numCol="1" spcCol="1270" anchor="ctr" anchorCtr="0">
-          <a:noAutofit/>
-        </a:bodyPr>
-        <a:lstStyle/>
-        <a:p>
-          <a:pPr marL="0" lvl="0" indent="0" algn="ctr" defTabSz="666750">
-            <a:lnSpc>
-              <a:spcPct val="90000"/>
-            </a:lnSpc>
-            <a:spcBef>
-              <a:spcPct val="0"/>
-            </a:spcBef>
-            <a:spcAft>
-              <a:spcPct val="35000"/>
-            </a:spcAft>
-            <a:buNone/>
-          </a:pPr>
-          <a:r>
-            <a:rPr lang="en-US" sz="1500" kern="1200" dirty="0"/>
-            <a:t>Scholarship</a:t>
+            <a:rPr lang="en-US" sz="1000" kern="1200" dirty="0"/>
+            <a:t>Funding applications</a:t>
           </a:r>
         </a:p>
       </dsp:txBody>
@@ -6417,6 +6291,86 @@
           <a:avLst/>
         </a:prstGeom>
         <a:solidFill>
+          <a:schemeClr val="accent3">
+            <a:tint val="40000"/>
+            <a:alpha val="90000"/>
+            <a:hueOff val="0"/>
+            <a:satOff val="0"/>
+            <a:lumOff val="0"/>
+            <a:alphaOff val="0"/>
+          </a:schemeClr>
+        </a:solidFill>
+        <a:ln w="12700" cap="flat" cmpd="sng" algn="ctr">
+          <a:solidFill>
+            <a:schemeClr val="accent3">
+              <a:tint val="40000"/>
+              <a:alpha val="90000"/>
+              <a:hueOff val="0"/>
+              <a:satOff val="0"/>
+              <a:lumOff val="0"/>
+              <a:alphaOff val="0"/>
+            </a:schemeClr>
+          </a:solidFill>
+          <a:prstDash val="solid"/>
+          <a:miter lim="800000"/>
+        </a:ln>
+        <a:effectLst/>
+      </dsp:spPr>
+      <dsp:style>
+        <a:lnRef idx="2">
+          <a:scrgbClr r="0" g="0" b="0"/>
+        </a:lnRef>
+        <a:fillRef idx="1">
+          <a:scrgbClr r="0" g="0" b="0"/>
+        </a:fillRef>
+        <a:effectRef idx="0">
+          <a:scrgbClr r="0" g="0" b="0"/>
+        </a:effectRef>
+        <a:fontRef idx="minor"/>
+      </dsp:style>
+      <dsp:txBody>
+        <a:bodyPr spcFirstLastPara="0" vert="horz" wrap="square" lIns="71120" tIns="12700" rIns="71120" bIns="12700" numCol="1" spcCol="1270" anchor="ctr" anchorCtr="0">
+          <a:noAutofit/>
+        </a:bodyPr>
+        <a:lstStyle/>
+        <a:p>
+          <a:pPr marL="0" lvl="0" indent="0" algn="ctr" defTabSz="444500">
+            <a:lnSpc>
+              <a:spcPct val="90000"/>
+            </a:lnSpc>
+            <a:spcBef>
+              <a:spcPct val="0"/>
+            </a:spcBef>
+            <a:spcAft>
+              <a:spcPct val="35000"/>
+            </a:spcAft>
+            <a:buNone/>
+          </a:pPr>
+          <a:r>
+            <a:rPr lang="en-US" sz="1000" kern="1200" dirty="0"/>
+            <a:t>Research presentations</a:t>
+          </a:r>
+        </a:p>
+      </dsp:txBody>
+      <dsp:txXfrm>
+        <a:off x="2533" y="382206"/>
+        <a:ext cx="1727738" cy="323549"/>
+      </dsp:txXfrm>
+    </dsp:sp>
+    <dsp:sp modelId="{AB54E4C4-BF3C-48E1-B874-00294ABBA625}">
+      <dsp:nvSpPr>
+        <dsp:cNvPr id="0" name=""/>
+        <dsp:cNvSpPr/>
+      </dsp:nvSpPr>
+      <dsp:spPr>
+        <a:xfrm>
+          <a:off x="1730272" y="382206"/>
+          <a:ext cx="1727738" cy="323549"/>
+        </a:xfrm>
+        <a:prstGeom prst="rect">
+          <a:avLst/>
+        </a:prstGeom>
+        <a:solidFill>
           <a:schemeClr val="accent4">
             <a:tint val="40000"/>
             <a:alpha val="90000"/>
@@ -6455,12 +6409,12 @@
         <a:fontRef idx="minor"/>
       </dsp:style>
       <dsp:txBody>
-        <a:bodyPr spcFirstLastPara="0" vert="horz" wrap="square" lIns="106680" tIns="19050" rIns="106680" bIns="19050" numCol="1" spcCol="1270" anchor="ctr" anchorCtr="0">
+        <a:bodyPr spcFirstLastPara="0" vert="horz" wrap="square" lIns="71120" tIns="12700" rIns="71120" bIns="12700" numCol="1" spcCol="1270" anchor="ctr" anchorCtr="0">
           <a:noAutofit/>
         </a:bodyPr>
         <a:lstStyle/>
         <a:p>
-          <a:pPr marL="0" lvl="0" indent="0" algn="ctr" defTabSz="666750">
+          <a:pPr marL="0" lvl="0" indent="0" algn="ctr" defTabSz="444500">
             <a:lnSpc>
               <a:spcPct val="90000"/>
             </a:lnSpc>
@@ -6473,24 +6427,24 @@
             <a:buNone/>
           </a:pPr>
           <a:r>
-            <a:rPr lang="en-US" sz="1500" kern="1200" dirty="0"/>
-            <a:t>Research</a:t>
+            <a:rPr lang="en-US" sz="1000" kern="1200" dirty="0"/>
+            <a:t>Potential Programs/Faculty</a:t>
           </a:r>
         </a:p>
       </dsp:txBody>
       <dsp:txXfrm>
-        <a:off x="2533" y="382206"/>
+        <a:off x="1730272" y="382206"/>
         <a:ext cx="1727738" cy="323549"/>
       </dsp:txXfrm>
     </dsp:sp>
-    <dsp:sp modelId="{AB54E4C4-BF3C-48E1-B874-00294ABBA625}">
+    <dsp:sp modelId="{47A5116C-0456-4E25-ABC0-9122A779E8F1}">
       <dsp:nvSpPr>
         <dsp:cNvPr id="0" name=""/>
         <dsp:cNvSpPr/>
       </dsp:nvSpPr>
       <dsp:spPr>
         <a:xfrm>
-          <a:off x="1730272" y="382206"/>
+          <a:off x="3458010" y="382206"/>
           <a:ext cx="1727738" cy="323549"/>
         </a:xfrm>
         <a:prstGeom prst="rect">
@@ -6535,12 +6489,12 @@
         <a:fontRef idx="minor"/>
       </dsp:style>
       <dsp:txBody>
-        <a:bodyPr spcFirstLastPara="0" vert="horz" wrap="square" lIns="106680" tIns="19050" rIns="106680" bIns="19050" numCol="1" spcCol="1270" anchor="ctr" anchorCtr="0">
+        <a:bodyPr spcFirstLastPara="0" vert="horz" wrap="square" lIns="71120" tIns="12700" rIns="71120" bIns="12700" numCol="1" spcCol="1270" anchor="ctr" anchorCtr="0">
           <a:noAutofit/>
         </a:bodyPr>
         <a:lstStyle/>
         <a:p>
-          <a:pPr marL="0" lvl="0" indent="0" algn="ctr" defTabSz="666750">
+          <a:pPr marL="0" lvl="0" indent="0" algn="ctr" defTabSz="444500">
             <a:lnSpc>
               <a:spcPct val="90000"/>
             </a:lnSpc>
@@ -6553,88 +6507,8 @@
             <a:buNone/>
           </a:pPr>
           <a:r>
-            <a:rPr lang="en-US" sz="1500" kern="1200" dirty="0"/>
-            <a:t>Graduate School</a:t>
-          </a:r>
-        </a:p>
-      </dsp:txBody>
-      <dsp:txXfrm>
-        <a:off x="1730272" y="382206"/>
-        <a:ext cx="1727738" cy="323549"/>
-      </dsp:txXfrm>
-    </dsp:sp>
-    <dsp:sp modelId="{47A5116C-0456-4E25-ABC0-9122A779E8F1}">
-      <dsp:nvSpPr>
-        <dsp:cNvPr id="0" name=""/>
-        <dsp:cNvSpPr/>
-      </dsp:nvSpPr>
-      <dsp:spPr>
-        <a:xfrm>
-          <a:off x="3458010" y="382206"/>
-          <a:ext cx="1727738" cy="323549"/>
-        </a:xfrm>
-        <a:prstGeom prst="rect">
-          <a:avLst/>
-        </a:prstGeom>
-        <a:solidFill>
-          <a:schemeClr val="accent6">
-            <a:tint val="40000"/>
-            <a:alpha val="90000"/>
-            <a:hueOff val="0"/>
-            <a:satOff val="0"/>
-            <a:lumOff val="0"/>
-            <a:alphaOff val="0"/>
-          </a:schemeClr>
-        </a:solidFill>
-        <a:ln w="12700" cap="flat" cmpd="sng" algn="ctr">
-          <a:solidFill>
-            <a:schemeClr val="accent6">
-              <a:tint val="40000"/>
-              <a:alpha val="90000"/>
-              <a:hueOff val="0"/>
-              <a:satOff val="0"/>
-              <a:lumOff val="0"/>
-              <a:alphaOff val="0"/>
-            </a:schemeClr>
-          </a:solidFill>
-          <a:prstDash val="solid"/>
-          <a:miter lim="800000"/>
-        </a:ln>
-        <a:effectLst/>
-      </dsp:spPr>
-      <dsp:style>
-        <a:lnRef idx="2">
-          <a:scrgbClr r="0" g="0" b="0"/>
-        </a:lnRef>
-        <a:fillRef idx="1">
-          <a:scrgbClr r="0" g="0" b="0"/>
-        </a:fillRef>
-        <a:effectRef idx="0">
-          <a:scrgbClr r="0" g="0" b="0"/>
-        </a:effectRef>
-        <a:fontRef idx="minor"/>
-      </dsp:style>
-      <dsp:txBody>
-        <a:bodyPr spcFirstLastPara="0" vert="horz" wrap="square" lIns="106680" tIns="19050" rIns="106680" bIns="19050" numCol="1" spcCol="1270" anchor="ctr" anchorCtr="0">
-          <a:noAutofit/>
-        </a:bodyPr>
-        <a:lstStyle/>
-        <a:p>
-          <a:pPr marL="0" lvl="0" indent="0" algn="ctr" defTabSz="666750">
-            <a:lnSpc>
-              <a:spcPct val="90000"/>
-            </a:lnSpc>
-            <a:spcBef>
-              <a:spcPct val="0"/>
-            </a:spcBef>
-            <a:spcAft>
-              <a:spcPct val="35000"/>
-            </a:spcAft>
-            <a:buNone/>
-          </a:pPr>
-          <a:r>
-            <a:rPr lang="en-US" sz="1500" kern="1200" dirty="0"/>
-            <a:t>Scholarship</a:t>
+            <a:rPr lang="en-US" sz="1000" kern="1200" dirty="0"/>
+            <a:t>Program Funding</a:t>
           </a:r>
         </a:p>
       </dsp:txBody>
@@ -17428,14 +17302,6 @@
                 </a:solidFill>
               </a:rPr>
             </a:br>
-            <a:r>
-              <a:rPr lang="en-US" sz="1800" dirty="0">
-                <a:solidFill>
-                  <a:schemeClr val="bg1"/>
-                </a:solidFill>
-              </a:rPr>
-              <a:t>Jacob M. Green</a:t>
-            </a:r>
             <a:endParaRPr lang="en-US" sz="3200" dirty="0">
               <a:solidFill>
                 <a:schemeClr val="bg1"/>
@@ -18979,7 +18845,23 @@
                   <a:schemeClr val="bg1"/>
                 </a:solidFill>
               </a:rPr>
-              <a:t>Post-BAC: self- funded through loans, employment, institution funded</a:t>
+              <a:t>Post-</a:t>
+            </a:r>
+            <a:r>
+              <a:rPr lang="en-US" sz="2400" b="1" dirty="0" err="1">
+                <a:solidFill>
+                  <a:schemeClr val="bg1"/>
+                </a:solidFill>
+              </a:rPr>
+              <a:t>Bacc</a:t>
+            </a:r>
+            <a:r>
+              <a:rPr lang="en-US" sz="2400" b="1" dirty="0">
+                <a:solidFill>
+                  <a:schemeClr val="bg1"/>
+                </a:solidFill>
+              </a:rPr>
+              <a:t>: self- funded through loans, employment, institution funded</a:t>
             </a:r>
           </a:p>
           <a:p>
@@ -20498,7 +20380,7 @@
                   <a:schemeClr val="bg1"/>
                 </a:solidFill>
               </a:rPr>
-              <a:t>You must customize every application!</a:t>
+              <a:t>You must customize every application *</a:t>
             </a:r>
           </a:p>
           <a:p>
@@ -22933,38 +22815,117 @@
           </a:p>
         </p:txBody>
       </p:sp>
-      <p:graphicFrame>
-        <p:nvGraphicFramePr>
-          <p:cNvPr id="6" name="Diagram 5">
+      <p:sp>
+        <p:nvSpPr>
+          <p:cNvPr id="4" name="TextBox 3">
             <a:extLst>
               <a:ext uri="{FF2B5EF4-FFF2-40B4-BE49-F238E27FC236}">
-                <a16:creationId xmlns:a16="http://schemas.microsoft.com/office/drawing/2014/main" id="{F1B11235-622C-4F9E-AB3E-9E720DCDCEDC}"/>
+                <a16:creationId xmlns:a16="http://schemas.microsoft.com/office/drawing/2014/main" id="{901EE0EF-8DB8-4D63-9D81-A357AE736D4C}"/>
               </a:ext>
             </a:extLst>
           </p:cNvPr>
-          <p:cNvGraphicFramePr/>
-          <p:nvPr>
-            <p:extLst>
-              <p:ext uri="{D42A27DB-BD31-4B8C-83A1-F6EECF244321}">
-                <p14:modId xmlns:p14="http://schemas.microsoft.com/office/powerpoint/2010/main" val="1565332842"/>
-              </p:ext>
-            </p:extLst>
-          </p:nvPr>
-        </p:nvGraphicFramePr>
-        <p:xfrm>
-          <a:off x="3501858" y="1615958"/>
-          <a:ext cx="5188283" cy="4994567"/>
-        </p:xfrm>
-        <a:graphic>
-          <a:graphicData uri="http://schemas.openxmlformats.org/drawingml/2006/diagram">
-            <dgm:relIds xmlns:dgm="http://schemas.openxmlformats.org/drawingml/2006/diagram" xmlns:r="http://schemas.openxmlformats.org/officeDocument/2006/relationships" r:dm="rId2" r:lo="rId3" r:qs="rId4" r:cs="rId5"/>
-          </a:graphicData>
-        </a:graphic>
-      </p:graphicFrame>
+          <p:cNvSpPr txBox="1"/>
+          <p:nvPr/>
+        </p:nvSpPr>
+        <p:spPr>
+          <a:xfrm>
+            <a:off x="1048624" y="1963024"/>
+            <a:ext cx="9619376" cy="1754326"/>
+          </a:xfrm>
+          <a:prstGeom prst="rect">
+            <a:avLst/>
+          </a:prstGeom>
+          <a:noFill/>
+        </p:spPr>
+        <p:txBody>
+          <a:bodyPr wrap="square" rtlCol="0">
+            <a:spAutoFit/>
+          </a:bodyPr>
+          <a:lstStyle/>
+          <a:p>
+            <a:pPr marL="285750" indent="-285750">
+              <a:buFont typeface="Arial" panose="020B0604020202020204" pitchFamily="34" charset="0"/>
+              <a:buChar char="•"/>
+            </a:pPr>
+            <a:r>
+              <a:rPr lang="en-US" dirty="0">
+                <a:solidFill>
+                  <a:schemeClr val="bg1"/>
+                </a:solidFill>
+              </a:rPr>
+              <a:t>Stronger personal statement</a:t>
+            </a:r>
+          </a:p>
+          <a:p>
+            <a:pPr marL="285750" indent="-285750">
+              <a:buFont typeface="Arial" panose="020B0604020202020204" pitchFamily="34" charset="0"/>
+              <a:buChar char="•"/>
+            </a:pPr>
+            <a:r>
+              <a:rPr lang="en-US" dirty="0">
+                <a:solidFill>
+                  <a:schemeClr val="bg1"/>
+                </a:solidFill>
+              </a:rPr>
+              <a:t>Writing skills for the application process</a:t>
+            </a:r>
+          </a:p>
+          <a:p>
+            <a:pPr marL="285750" indent="-285750">
+              <a:buFont typeface="Arial" panose="020B0604020202020204" pitchFamily="34" charset="0"/>
+              <a:buChar char="•"/>
+            </a:pPr>
+            <a:r>
+              <a:rPr lang="en-US" dirty="0">
+                <a:solidFill>
+                  <a:schemeClr val="bg1"/>
+                </a:solidFill>
+              </a:rPr>
+              <a:t>Opportunities to present to the group</a:t>
+            </a:r>
+          </a:p>
+          <a:p>
+            <a:pPr marL="285750" indent="-285750">
+              <a:buFont typeface="Arial" panose="020B0604020202020204" pitchFamily="34" charset="0"/>
+              <a:buChar char="•"/>
+            </a:pPr>
+            <a:r>
+              <a:rPr lang="en-US" dirty="0">
+                <a:solidFill>
+                  <a:schemeClr val="bg1"/>
+                </a:solidFill>
+              </a:rPr>
+              <a:t>Fee waivers for cycle, 1 year, 2 year</a:t>
+            </a:r>
+          </a:p>
+          <a:p>
+            <a:pPr marL="285750" indent="-285750">
+              <a:buFont typeface="Arial" panose="020B0604020202020204" pitchFamily="34" charset="0"/>
+              <a:buChar char="•"/>
+            </a:pPr>
+            <a:endParaRPr lang="en-US" dirty="0">
+              <a:solidFill>
+                <a:schemeClr val="bg1"/>
+              </a:solidFill>
+            </a:endParaRPr>
+          </a:p>
+          <a:p>
+            <a:pPr marL="285750" indent="-285750">
+              <a:buFont typeface="Arial" panose="020B0604020202020204" pitchFamily="34" charset="0"/>
+              <a:buChar char="•"/>
+            </a:pPr>
+            <a:endParaRPr lang="en-US" dirty="0">
+              <a:solidFill>
+                <a:schemeClr val="bg1"/>
+              </a:solidFill>
+            </a:endParaRPr>
+          </a:p>
+        </p:txBody>
+      </p:sp>
     </p:spTree>
     <p:extLst>
       <p:ext uri="{BB962C8B-B14F-4D97-AF65-F5344CB8AC3E}">
-        <p14:creationId xmlns:p14="http://schemas.microsoft.com/office/powerpoint/2010/main" val="3028470720"/>
+        <p14:creationId xmlns:p14="http://schemas.microsoft.com/office/powerpoint/2010/main" val="1343411099"/>
       </p:ext>
     </p:extLst>
   </p:cSld>
@@ -23665,6 +23626,743 @@
                   <a:schemeClr val="bg1"/>
                 </a:solidFill>
               </a:rPr>
+              <a:t>Building a graduate school timeline</a:t>
+            </a:r>
+          </a:p>
+        </p:txBody>
+      </p:sp>
+      <p:graphicFrame>
+        <p:nvGraphicFramePr>
+          <p:cNvPr id="6" name="Diagram 5">
+            <a:extLst>
+              <a:ext uri="{FF2B5EF4-FFF2-40B4-BE49-F238E27FC236}">
+                <a16:creationId xmlns:a16="http://schemas.microsoft.com/office/drawing/2014/main" id="{F1B11235-622C-4F9E-AB3E-9E720DCDCEDC}"/>
+              </a:ext>
+            </a:extLst>
+          </p:cNvPr>
+          <p:cNvGraphicFramePr/>
+          <p:nvPr>
+            <p:extLst>
+              <p:ext uri="{D42A27DB-BD31-4B8C-83A1-F6EECF244321}">
+                <p14:modId xmlns:p14="http://schemas.microsoft.com/office/powerpoint/2010/main" val="385346120"/>
+              </p:ext>
+            </p:extLst>
+          </p:nvPr>
+        </p:nvGraphicFramePr>
+        <p:xfrm>
+          <a:off x="3501858" y="1615958"/>
+          <a:ext cx="5188283" cy="4994567"/>
+        </p:xfrm>
+        <a:graphic>
+          <a:graphicData uri="http://schemas.openxmlformats.org/drawingml/2006/diagram">
+            <dgm:relIds xmlns:dgm="http://schemas.openxmlformats.org/drawingml/2006/diagram" xmlns:r="http://schemas.openxmlformats.org/officeDocument/2006/relationships" r:dm="rId2" r:lo="rId3" r:qs="rId4" r:cs="rId5"/>
+          </a:graphicData>
+        </a:graphic>
+      </p:graphicFrame>
+    </p:spTree>
+    <p:extLst>
+      <p:ext uri="{BB962C8B-B14F-4D97-AF65-F5344CB8AC3E}">
+        <p14:creationId xmlns:p14="http://schemas.microsoft.com/office/powerpoint/2010/main" val="3028470720"/>
+      </p:ext>
+    </p:extLst>
+  </p:cSld>
+  <p:clrMapOvr>
+    <a:masterClrMapping/>
+  </p:clrMapOvr>
+</p:sld>
+</file>
+
+<file path=ppt/slides/slide18.xml><?xml version="1.0" encoding="utf-8"?>
+<p:sld xmlns:a="http://schemas.openxmlformats.org/drawingml/2006/main" xmlns:r="http://schemas.openxmlformats.org/officeDocument/2006/relationships" xmlns:p="http://schemas.openxmlformats.org/presentationml/2006/main">
+  <p:cSld>
+    <p:bg>
+      <p:bgPr>
+        <a:solidFill>
+          <a:schemeClr val="bg1"/>
+        </a:solidFill>
+        <a:effectLst/>
+      </p:bgPr>
+    </p:bg>
+    <p:spTree>
+      <p:nvGrpSpPr>
+        <p:cNvPr id="1" name=""/>
+        <p:cNvGrpSpPr/>
+        <p:nvPr/>
+      </p:nvGrpSpPr>
+      <p:grpSpPr>
+        <a:xfrm>
+          <a:off x="0" y="0"/>
+          <a:ext cx="0" cy="0"/>
+          <a:chOff x="0" y="0"/>
+          <a:chExt cx="0" cy="0"/>
+        </a:xfrm>
+      </p:grpSpPr>
+      <p:sp>
+        <p:nvSpPr>
+          <p:cNvPr id="8" name="Rectangle 7">
+            <a:extLst>
+              <a:ext uri="{FF2B5EF4-FFF2-40B4-BE49-F238E27FC236}">
+                <a16:creationId xmlns:a16="http://schemas.microsoft.com/office/drawing/2014/main" id="{BD4C0BBB-0042-4603-A226-6117F3FD5B3C}"/>
+              </a:ext>
+              <a:ext uri="{C183D7F6-B498-43B3-948B-1728B52AA6E4}">
+                <adec:decorative xmlns:adec="http://schemas.microsoft.com/office/drawing/2017/decorative" val="1"/>
+              </a:ext>
+            </a:extLst>
+          </p:cNvPr>
+          <p:cNvSpPr>
+            <a:spLocks noGrp="1" noRot="1" noChangeAspect="1" noMove="1" noResize="1" noEditPoints="1" noAdjustHandles="1" noChangeArrowheads="1" noChangeShapeType="1" noTextEdit="1"/>
+          </p:cNvSpPr>
+          <p:nvPr>
+            <p:extLst>
+              <p:ext uri="{386F3935-93C4-4BCD-93E2-E3B085C9AB24}">
+                <p16:designElem xmlns:p16="http://schemas.microsoft.com/office/powerpoint/2015/main" val="1"/>
+              </p:ext>
+            </p:extLst>
+          </p:nvPr>
+        </p:nvSpPr>
+        <p:spPr>
+          <a:xfrm rot="10800000" flipH="1">
+            <a:off x="0" y="6400799"/>
+            <a:ext cx="12192000" cy="456773"/>
+          </a:xfrm>
+          <a:prstGeom prst="rect">
+            <a:avLst/>
+          </a:prstGeom>
+          <a:gradFill>
+            <a:gsLst>
+              <a:gs pos="14000">
+                <a:schemeClr val="accent4">
+                  <a:alpha val="28000"/>
+                </a:schemeClr>
+              </a:gs>
+              <a:gs pos="100000">
+                <a:schemeClr val="accent5">
+                  <a:alpha val="85000"/>
+                </a:schemeClr>
+              </a:gs>
+            </a:gsLst>
+            <a:lin ang="6000000" scaled="0"/>
+          </a:gradFill>
+          <a:ln>
+            <a:noFill/>
+          </a:ln>
+        </p:spPr>
+        <p:style>
+          <a:lnRef idx="2">
+            <a:schemeClr val="accent1">
+              <a:shade val="50000"/>
+            </a:schemeClr>
+          </a:lnRef>
+          <a:fillRef idx="1">
+            <a:schemeClr val="accent1"/>
+          </a:fillRef>
+          <a:effectRef idx="0">
+            <a:schemeClr val="accent1"/>
+          </a:effectRef>
+          <a:fontRef idx="minor">
+            <a:schemeClr val="lt1"/>
+          </a:fontRef>
+        </p:style>
+        <p:txBody>
+          <a:bodyPr rtlCol="0" anchor="ctr"/>
+          <a:lstStyle/>
+          <a:p>
+            <a:pPr algn="ctr"/>
+            <a:endParaRPr lang="en-US"/>
+          </a:p>
+        </p:txBody>
+      </p:sp>
+      <p:sp>
+        <p:nvSpPr>
+          <p:cNvPr id="10" name="Rectangle 9">
+            <a:extLst>
+              <a:ext uri="{FF2B5EF4-FFF2-40B4-BE49-F238E27FC236}">
+                <a16:creationId xmlns:a16="http://schemas.microsoft.com/office/drawing/2014/main" id="{EC44F520-2598-460E-9F91-B02F60830CA2}"/>
+              </a:ext>
+              <a:ext uri="{C183D7F6-B498-43B3-948B-1728B52AA6E4}">
+                <adec:decorative xmlns:adec="http://schemas.microsoft.com/office/drawing/2017/decorative" val="1"/>
+              </a:ext>
+            </a:extLst>
+          </p:cNvPr>
+          <p:cNvSpPr>
+            <a:spLocks noGrp="1" noRot="1" noChangeAspect="1" noMove="1" noResize="1" noEditPoints="1" noAdjustHandles="1" noChangeArrowheads="1" noChangeShapeType="1" noTextEdit="1"/>
+          </p:cNvSpPr>
+          <p:nvPr>
+            <p:extLst>
+              <p:ext uri="{386F3935-93C4-4BCD-93E2-E3B085C9AB24}">
+                <p16:designElem xmlns:p16="http://schemas.microsoft.com/office/powerpoint/2015/main" val="1"/>
+              </p:ext>
+            </p:extLst>
+          </p:nvPr>
+        </p:nvSpPr>
+        <p:spPr>
+          <a:xfrm flipH="1">
+            <a:off x="4038600" y="6400799"/>
+            <a:ext cx="8153398" cy="456772"/>
+          </a:xfrm>
+          <a:prstGeom prst="rect">
+            <a:avLst/>
+          </a:prstGeom>
+          <a:gradFill>
+            <a:gsLst>
+              <a:gs pos="9000">
+                <a:schemeClr val="accent2">
+                  <a:lumMod val="60000"/>
+                  <a:lumOff val="40000"/>
+                  <a:alpha val="55000"/>
+                </a:schemeClr>
+              </a:gs>
+              <a:gs pos="99000">
+                <a:schemeClr val="accent2"/>
+              </a:gs>
+            </a:gsLst>
+            <a:lin ang="14400000" scaled="0"/>
+          </a:gradFill>
+          <a:ln>
+            <a:noFill/>
+          </a:ln>
+        </p:spPr>
+        <p:style>
+          <a:lnRef idx="2">
+            <a:schemeClr val="accent1">
+              <a:shade val="50000"/>
+            </a:schemeClr>
+          </a:lnRef>
+          <a:fillRef idx="1">
+            <a:schemeClr val="accent1"/>
+          </a:fillRef>
+          <a:effectRef idx="0">
+            <a:schemeClr val="accent1"/>
+          </a:effectRef>
+          <a:fontRef idx="minor">
+            <a:schemeClr val="lt1"/>
+          </a:fontRef>
+        </p:style>
+        <p:txBody>
+          <a:bodyPr rtlCol="0" anchor="ctr"/>
+          <a:lstStyle/>
+          <a:p>
+            <a:pPr algn="ctr"/>
+            <a:endParaRPr lang="en-US"/>
+          </a:p>
+        </p:txBody>
+      </p:sp>
+      <p:sp useBgFill="1">
+        <p:nvSpPr>
+          <p:cNvPr id="12" name="Rectangle 11">
+            <a:extLst>
+              <a:ext uri="{FF2B5EF4-FFF2-40B4-BE49-F238E27FC236}">
+                <a16:creationId xmlns:a16="http://schemas.microsoft.com/office/drawing/2014/main" id="{7404E292-5FAB-47E8-A663-A07530CED8FF}"/>
+              </a:ext>
+              <a:ext uri="{C183D7F6-B498-43B3-948B-1728B52AA6E4}">
+                <adec:decorative xmlns:adec="http://schemas.microsoft.com/office/drawing/2017/decorative" val="1"/>
+              </a:ext>
+            </a:extLst>
+          </p:cNvPr>
+          <p:cNvSpPr>
+            <a:spLocks noGrp="1" noRot="1" noChangeAspect="1" noMove="1" noResize="1" noEditPoints="1" noAdjustHandles="1" noChangeArrowheads="1" noChangeShapeType="1" noTextEdit="1"/>
+          </p:cNvSpPr>
+          <p:nvPr>
+            <p:extLst>
+              <p:ext uri="{386F3935-93C4-4BCD-93E2-E3B085C9AB24}">
+                <p16:designElem xmlns:p16="http://schemas.microsoft.com/office/powerpoint/2015/main" val="1"/>
+              </p:ext>
+            </p:extLst>
+          </p:nvPr>
+        </p:nvSpPr>
+        <p:spPr>
+          <a:xfrm>
+            <a:off x="0" y="0"/>
+            <a:ext cx="12192000" cy="6858000"/>
+          </a:xfrm>
+          <a:prstGeom prst="rect">
+            <a:avLst/>
+          </a:prstGeom>
+          <a:ln w="12700" cap="flat" cmpd="sng" algn="ctr">
+            <a:noFill/>
+            <a:prstDash val="solid"/>
+            <a:miter lim="800000"/>
+          </a:ln>
+          <a:effectLst/>
+          <a:extLst>
+            <a:ext uri="{91240B29-F687-4F45-9708-019B960494DF}">
+              <a14:hiddenLine xmlns:a14="http://schemas.microsoft.com/office/drawing/2010/main" w="12700" cap="flat" cmpd="sng" algn="ctr">
+                <a:solidFill>
+                  <a:schemeClr val="accent1">
+                    <a:shade val="50000"/>
+                  </a:schemeClr>
+                </a:solidFill>
+                <a:prstDash val="solid"/>
+                <a:miter lim="800000"/>
+              </a14:hiddenLine>
+            </a:ext>
+          </a:extLst>
+        </p:spPr>
+        <p:style>
+          <a:lnRef idx="2">
+            <a:schemeClr val="accent1">
+              <a:shade val="50000"/>
+            </a:schemeClr>
+          </a:lnRef>
+          <a:fillRef idx="1">
+            <a:schemeClr val="accent1"/>
+          </a:fillRef>
+          <a:effectRef idx="0">
+            <a:schemeClr val="accent1"/>
+          </a:effectRef>
+          <a:fontRef idx="minor">
+            <a:schemeClr val="lt1"/>
+          </a:fontRef>
+        </p:style>
+        <p:txBody>
+          <a:bodyPr rtlCol="0" anchor="ctr"/>
+          <a:lstStyle/>
+          <a:p>
+            <a:pPr algn="ctr"/>
+            <a:endParaRPr lang="en-US"/>
+          </a:p>
+        </p:txBody>
+      </p:sp>
+      <p:sp>
+        <p:nvSpPr>
+          <p:cNvPr id="14" name="Rectangle 13">
+            <a:extLst>
+              <a:ext uri="{FF2B5EF4-FFF2-40B4-BE49-F238E27FC236}">
+                <a16:creationId xmlns:a16="http://schemas.microsoft.com/office/drawing/2014/main" id="{D80FF8ED-64CE-400C-A4D5-9F943FC264DE}"/>
+              </a:ext>
+              <a:ext uri="{C183D7F6-B498-43B3-948B-1728B52AA6E4}">
+                <adec:decorative xmlns:adec="http://schemas.microsoft.com/office/drawing/2017/decorative" val="1"/>
+              </a:ext>
+            </a:extLst>
+          </p:cNvPr>
+          <p:cNvSpPr>
+            <a:spLocks noGrp="1" noRot="1" noChangeAspect="1" noMove="1" noResize="1" noEditPoints="1" noAdjustHandles="1" noChangeArrowheads="1" noChangeShapeType="1" noTextEdit="1"/>
+          </p:cNvSpPr>
+          <p:nvPr>
+            <p:extLst>
+              <p:ext uri="{386F3935-93C4-4BCD-93E2-E3B085C9AB24}">
+                <p16:designElem xmlns:p16="http://schemas.microsoft.com/office/powerpoint/2015/main" val="1"/>
+              </p:ext>
+            </p:extLst>
+          </p:nvPr>
+        </p:nvSpPr>
+        <p:spPr>
+          <a:xfrm rot="10800000" flipH="1">
+            <a:off x="0" y="0"/>
+            <a:ext cx="12191999" cy="6858000"/>
+          </a:xfrm>
+          <a:prstGeom prst="rect">
+            <a:avLst/>
+          </a:prstGeom>
+          <a:gradFill>
+            <a:gsLst>
+              <a:gs pos="0">
+                <a:schemeClr val="accent5">
+                  <a:alpha val="75000"/>
+                </a:schemeClr>
+              </a:gs>
+              <a:gs pos="100000">
+                <a:schemeClr val="accent2">
+                  <a:lumMod val="60000"/>
+                  <a:lumOff val="40000"/>
+                </a:schemeClr>
+              </a:gs>
+            </a:gsLst>
+            <a:lin ang="13800000" scaled="0"/>
+          </a:gradFill>
+          <a:ln>
+            <a:noFill/>
+          </a:ln>
+        </p:spPr>
+        <p:style>
+          <a:lnRef idx="2">
+            <a:schemeClr val="accent1">
+              <a:shade val="50000"/>
+            </a:schemeClr>
+          </a:lnRef>
+          <a:fillRef idx="1">
+            <a:schemeClr val="accent1"/>
+          </a:fillRef>
+          <a:effectRef idx="0">
+            <a:schemeClr val="accent1"/>
+          </a:effectRef>
+          <a:fontRef idx="minor">
+            <a:schemeClr val="lt1"/>
+          </a:fontRef>
+        </p:style>
+        <p:txBody>
+          <a:bodyPr rtlCol="0" anchor="ctr"/>
+          <a:lstStyle/>
+          <a:p>
+            <a:pPr algn="ctr"/>
+            <a:endParaRPr lang="en-US"/>
+          </a:p>
+        </p:txBody>
+      </p:sp>
+      <p:sp>
+        <p:nvSpPr>
+          <p:cNvPr id="16" name="Rectangle 15">
+            <a:extLst>
+              <a:ext uri="{FF2B5EF4-FFF2-40B4-BE49-F238E27FC236}">
+                <a16:creationId xmlns:a16="http://schemas.microsoft.com/office/drawing/2014/main" id="{568868AD-100D-45F3-B11E-8A2936712B9E}"/>
+              </a:ext>
+              <a:ext uri="{C183D7F6-B498-43B3-948B-1728B52AA6E4}">
+                <adec:decorative xmlns:adec="http://schemas.microsoft.com/office/drawing/2017/decorative" val="1"/>
+              </a:ext>
+            </a:extLst>
+          </p:cNvPr>
+          <p:cNvSpPr>
+            <a:spLocks noGrp="1" noRot="1" noChangeAspect="1" noMove="1" noResize="1" noEditPoints="1" noAdjustHandles="1" noChangeArrowheads="1" noChangeShapeType="1" noTextEdit="1"/>
+          </p:cNvSpPr>
+          <p:nvPr>
+            <p:extLst>
+              <p:ext uri="{386F3935-93C4-4BCD-93E2-E3B085C9AB24}">
+                <p16:designElem xmlns:p16="http://schemas.microsoft.com/office/powerpoint/2015/main" val="1"/>
+              </p:ext>
+            </p:extLst>
+          </p:nvPr>
+        </p:nvSpPr>
+        <p:spPr>
+          <a:xfrm rot="10800000">
+            <a:off x="0" y="0"/>
+            <a:ext cx="12191999" cy="6858000"/>
+          </a:xfrm>
+          <a:prstGeom prst="rect">
+            <a:avLst/>
+          </a:prstGeom>
+          <a:gradFill>
+            <a:gsLst>
+              <a:gs pos="49000">
+                <a:schemeClr val="accent5">
+                  <a:alpha val="50000"/>
+                </a:schemeClr>
+              </a:gs>
+              <a:gs pos="100000">
+                <a:schemeClr val="accent2">
+                  <a:alpha val="74000"/>
+                </a:schemeClr>
+              </a:gs>
+            </a:gsLst>
+            <a:lin ang="15000000" scaled="0"/>
+          </a:gradFill>
+          <a:ln>
+            <a:noFill/>
+          </a:ln>
+        </p:spPr>
+        <p:style>
+          <a:lnRef idx="2">
+            <a:schemeClr val="accent1">
+              <a:shade val="50000"/>
+            </a:schemeClr>
+          </a:lnRef>
+          <a:fillRef idx="1">
+            <a:schemeClr val="accent1"/>
+          </a:fillRef>
+          <a:effectRef idx="0">
+            <a:schemeClr val="accent1"/>
+          </a:effectRef>
+          <a:fontRef idx="minor">
+            <a:schemeClr val="lt1"/>
+          </a:fontRef>
+        </p:style>
+        <p:txBody>
+          <a:bodyPr rtlCol="0" anchor="ctr"/>
+          <a:lstStyle/>
+          <a:p>
+            <a:pPr algn="ctr"/>
+            <a:endParaRPr lang="en-US"/>
+          </a:p>
+        </p:txBody>
+      </p:sp>
+      <p:sp>
+        <p:nvSpPr>
+          <p:cNvPr id="18" name="Rectangle 17">
+            <a:extLst>
+              <a:ext uri="{FF2B5EF4-FFF2-40B4-BE49-F238E27FC236}">
+                <a16:creationId xmlns:a16="http://schemas.microsoft.com/office/drawing/2014/main" id="{714742CC-05F9-44AC-AF98-AB6EF810E47D}"/>
+              </a:ext>
+              <a:ext uri="{C183D7F6-B498-43B3-948B-1728B52AA6E4}">
+                <adec:decorative xmlns:adec="http://schemas.microsoft.com/office/drawing/2017/decorative" val="1"/>
+              </a:ext>
+            </a:extLst>
+          </p:cNvPr>
+          <p:cNvSpPr>
+            <a:spLocks noGrp="1" noRot="1" noChangeAspect="1" noMove="1" noResize="1" noEditPoints="1" noAdjustHandles="1" noChangeArrowheads="1" noChangeShapeType="1" noTextEdit="1"/>
+          </p:cNvSpPr>
+          <p:nvPr>
+            <p:extLst>
+              <p:ext uri="{386F3935-93C4-4BCD-93E2-E3B085C9AB24}">
+                <p16:designElem xmlns:p16="http://schemas.microsoft.com/office/powerpoint/2015/main" val="1"/>
+              </p:ext>
+            </p:extLst>
+          </p:nvPr>
+        </p:nvSpPr>
+        <p:spPr>
+          <a:xfrm rot="10800000" flipH="1">
+            <a:off x="-2" y="0"/>
+            <a:ext cx="6096001" cy="6858000"/>
+          </a:xfrm>
+          <a:prstGeom prst="rect">
+            <a:avLst/>
+          </a:prstGeom>
+          <a:gradFill>
+            <a:gsLst>
+              <a:gs pos="0">
+                <a:schemeClr val="accent2">
+                  <a:alpha val="17000"/>
+                </a:schemeClr>
+              </a:gs>
+              <a:gs pos="85000">
+                <a:schemeClr val="accent4">
+                  <a:alpha val="40000"/>
+                </a:schemeClr>
+              </a:gs>
+            </a:gsLst>
+            <a:lin ang="14400000" scaled="0"/>
+          </a:gradFill>
+          <a:ln>
+            <a:noFill/>
+          </a:ln>
+        </p:spPr>
+        <p:style>
+          <a:lnRef idx="2">
+            <a:schemeClr val="accent1">
+              <a:shade val="50000"/>
+            </a:schemeClr>
+          </a:lnRef>
+          <a:fillRef idx="1">
+            <a:schemeClr val="accent1"/>
+          </a:fillRef>
+          <a:effectRef idx="0">
+            <a:schemeClr val="accent1"/>
+          </a:effectRef>
+          <a:fontRef idx="minor">
+            <a:schemeClr val="lt1"/>
+          </a:fontRef>
+        </p:style>
+        <p:txBody>
+          <a:bodyPr rtlCol="0" anchor="ctr"/>
+          <a:lstStyle/>
+          <a:p>
+            <a:pPr algn="ctr"/>
+            <a:endParaRPr lang="en-US"/>
+          </a:p>
+        </p:txBody>
+      </p:sp>
+      <p:sp>
+        <p:nvSpPr>
+          <p:cNvPr id="20" name="Freeform: Shape 13">
+            <a:extLst>
+              <a:ext uri="{FF2B5EF4-FFF2-40B4-BE49-F238E27FC236}">
+                <a16:creationId xmlns:a16="http://schemas.microsoft.com/office/drawing/2014/main" id="{853C77DB-C7E3-4B1F-9AD0-1EB2982A8659}"/>
+              </a:ext>
+              <a:ext uri="{C183D7F6-B498-43B3-948B-1728B52AA6E4}">
+                <adec:decorative xmlns:adec="http://schemas.microsoft.com/office/drawing/2017/decorative" val="1"/>
+              </a:ext>
+            </a:extLst>
+          </p:cNvPr>
+          <p:cNvSpPr>
+            <a:spLocks noGrp="1" noRot="1" noChangeAspect="1" noMove="1" noResize="1" noEditPoints="1" noAdjustHandles="1" noChangeArrowheads="1" noChangeShapeType="1" noTextEdit="1"/>
+          </p:cNvSpPr>
+          <p:nvPr>
+            <p:extLst>
+              <p:ext uri="{386F3935-93C4-4BCD-93E2-E3B085C9AB24}">
+                <p16:designElem xmlns:p16="http://schemas.microsoft.com/office/powerpoint/2015/main" val="1"/>
+              </p:ext>
+            </p:extLst>
+          </p:nvPr>
+        </p:nvSpPr>
+        <p:spPr>
+          <a:xfrm rot="5400000" flipH="1">
+            <a:off x="3460656" y="-2569189"/>
+            <a:ext cx="5115722" cy="10255626"/>
+          </a:xfrm>
+          <a:custGeom>
+            <a:avLst/>
+            <a:gdLst>
+              <a:gd name="connsiteX0" fmla="*/ 2065105 w 2065105"/>
+              <a:gd name="connsiteY0" fmla="*/ 0 h 4139967"/>
+              <a:gd name="connsiteX1" fmla="*/ 2065105 w 2065105"/>
+              <a:gd name="connsiteY1" fmla="*/ 4139967 h 4139967"/>
+              <a:gd name="connsiteX2" fmla="*/ 1858573 w 2065105"/>
+              <a:gd name="connsiteY2" fmla="*/ 4129538 h 4139967"/>
+              <a:gd name="connsiteX3" fmla="*/ 0 w 2065105"/>
+              <a:gd name="connsiteY3" fmla="*/ 2069983 h 4139967"/>
+              <a:gd name="connsiteX4" fmla="*/ 1858573 w 2065105"/>
+              <a:gd name="connsiteY4" fmla="*/ 10428 h 4139967"/>
+            </a:gdLst>
+            <a:ahLst/>
+            <a:cxnLst>
+              <a:cxn ang="0">
+                <a:pos x="connsiteX0" y="connsiteY0"/>
+              </a:cxn>
+              <a:cxn ang="0">
+                <a:pos x="connsiteX1" y="connsiteY1"/>
+              </a:cxn>
+              <a:cxn ang="0">
+                <a:pos x="connsiteX2" y="connsiteY2"/>
+              </a:cxn>
+              <a:cxn ang="0">
+                <a:pos x="connsiteX3" y="connsiteY3"/>
+              </a:cxn>
+              <a:cxn ang="0">
+                <a:pos x="connsiteX4" y="connsiteY4"/>
+              </a:cxn>
+            </a:cxnLst>
+            <a:rect l="l" t="t" r="r" b="b"/>
+            <a:pathLst>
+              <a:path w="2065105" h="4139967">
+                <a:moveTo>
+                  <a:pt x="2065105" y="0"/>
+                </a:moveTo>
+                <a:lnTo>
+                  <a:pt x="2065105" y="4139967"/>
+                </a:lnTo>
+                <a:lnTo>
+                  <a:pt x="1858573" y="4129538"/>
+                </a:lnTo>
+                <a:cubicBezTo>
+                  <a:pt x="814640" y="4023521"/>
+                  <a:pt x="0" y="3141887"/>
+                  <a:pt x="0" y="2069983"/>
+                </a:cubicBezTo>
+                <a:cubicBezTo>
+                  <a:pt x="0" y="998079"/>
+                  <a:pt x="814640" y="116446"/>
+                  <a:pt x="1858573" y="10428"/>
+                </a:cubicBezTo>
+                <a:close/>
+              </a:path>
+            </a:pathLst>
+          </a:custGeom>
+          <a:gradFill flip="none" rotWithShape="1">
+            <a:gsLst>
+              <a:gs pos="7000">
+                <a:schemeClr val="accent4">
+                  <a:lumMod val="60000"/>
+                  <a:lumOff val="40000"/>
+                  <a:alpha val="3000"/>
+                </a:schemeClr>
+              </a:gs>
+              <a:gs pos="100000">
+                <a:schemeClr val="accent4">
+                  <a:lumMod val="60000"/>
+                  <a:lumOff val="40000"/>
+                  <a:alpha val="37000"/>
+                </a:schemeClr>
+              </a:gs>
+            </a:gsLst>
+            <a:lin ang="2700000" scaled="1"/>
+            <a:tileRect/>
+          </a:gradFill>
+          <a:ln>
+            <a:noFill/>
+          </a:ln>
+        </p:spPr>
+        <p:style>
+          <a:lnRef idx="2">
+            <a:schemeClr val="accent1">
+              <a:shade val="50000"/>
+            </a:schemeClr>
+          </a:lnRef>
+          <a:fillRef idx="1">
+            <a:schemeClr val="accent1"/>
+          </a:fillRef>
+          <a:effectRef idx="0">
+            <a:schemeClr val="accent1"/>
+          </a:effectRef>
+          <a:fontRef idx="minor">
+            <a:schemeClr val="lt1"/>
+          </a:fontRef>
+        </p:style>
+        <p:txBody>
+          <a:bodyPr rtlCol="0" anchor="ctr"/>
+          <a:lstStyle/>
+          <a:p>
+            <a:pPr algn="ctr"/>
+            <a:endParaRPr lang="en-US"/>
+          </a:p>
+        </p:txBody>
+      </p:sp>
+      <p:sp>
+        <p:nvSpPr>
+          <p:cNvPr id="2" name="Title 1">
+            <a:extLst>
+              <a:ext uri="{FF2B5EF4-FFF2-40B4-BE49-F238E27FC236}">
+                <a16:creationId xmlns:a16="http://schemas.microsoft.com/office/drawing/2014/main" id="{8721456F-4979-406B-B7A4-8E16DFB0D3E8}"/>
+              </a:ext>
+            </a:extLst>
+          </p:cNvPr>
+          <p:cNvSpPr>
+            <a:spLocks noGrp="1"/>
+          </p:cNvSpPr>
+          <p:nvPr>
+            <p:ph type="title"/>
+          </p:nvPr>
+        </p:nvSpPr>
+        <p:spPr>
+          <a:xfrm>
+            <a:off x="1524000" y="104779"/>
+            <a:ext cx="9144000" cy="836322"/>
+          </a:xfrm>
+        </p:spPr>
+        <p:txBody>
+          <a:bodyPr vert="horz" lIns="0" tIns="0" rIns="0" bIns="0" rtlCol="0" anchor="ctr">
+            <a:normAutofit/>
+          </a:bodyPr>
+          <a:lstStyle/>
+          <a:p>
+            <a:pPr algn="ctr"/>
+            <a:r>
+              <a:rPr lang="en-US" sz="4400" spc="750" dirty="0">
+                <a:solidFill>
+                  <a:schemeClr val="bg1"/>
+                </a:solidFill>
+              </a:rPr>
+              <a:t>Activity</a:t>
+            </a:r>
+          </a:p>
+        </p:txBody>
+      </p:sp>
+      <p:sp>
+        <p:nvSpPr>
+          <p:cNvPr id="13" name="TextBox 12">
+            <a:extLst>
+              <a:ext uri="{FF2B5EF4-FFF2-40B4-BE49-F238E27FC236}">
+                <a16:creationId xmlns:a16="http://schemas.microsoft.com/office/drawing/2014/main" id="{466464D9-FC31-4EFD-8F90-B6CA56FA07CD}"/>
+              </a:ext>
+            </a:extLst>
+          </p:cNvPr>
+          <p:cNvSpPr txBox="1"/>
+          <p:nvPr/>
+        </p:nvSpPr>
+        <p:spPr>
+          <a:xfrm>
+            <a:off x="966242" y="779636"/>
+            <a:ext cx="10255626" cy="722442"/>
+          </a:xfrm>
+          <a:prstGeom prst="rect">
+            <a:avLst/>
+          </a:prstGeom>
+          <a:noFill/>
+        </p:spPr>
+        <p:txBody>
+          <a:bodyPr wrap="square" rtlCol="0">
+            <a:spAutoFit/>
+          </a:bodyPr>
+          <a:lstStyle/>
+          <a:p>
+            <a:pPr algn="ctr">
+              <a:lnSpc>
+                <a:spcPct val="200000"/>
+              </a:lnSpc>
+            </a:pPr>
+            <a:r>
+              <a:rPr lang="en-US" sz="2400" b="1" dirty="0">
+                <a:solidFill>
+                  <a:schemeClr val="bg1"/>
+                </a:solidFill>
+              </a:rPr>
               <a:t>Building a MARC timeline</a:t>
             </a:r>
           </a:p>
@@ -23819,7 +24517,7 @@
 </p:sld>
 </file>
 
-<file path=ppt/slides/slide18.xml><?xml version="1.0" encoding="utf-8"?>
+<file path=ppt/slides/slide19.xml><?xml version="1.0" encoding="utf-8"?>
 <p:sld xmlns:a="http://schemas.openxmlformats.org/drawingml/2006/main" xmlns:r="http://schemas.openxmlformats.org/officeDocument/2006/relationships" xmlns:p="http://schemas.openxmlformats.org/presentationml/2006/main">
   <p:cSld>
     <p:bg>
@@ -25250,7 +25948,7 @@
 </p:sld>
 </file>
 
-<file path=ppt/slides/slide19.xml><?xml version="1.0" encoding="utf-8"?>
+<file path=ppt/slides/slide2.xml><?xml version="1.0" encoding="utf-8"?>
 <p:sld xmlns:a="http://schemas.openxmlformats.org/drawingml/2006/main" xmlns:r="http://schemas.openxmlformats.org/officeDocument/2006/relationships" xmlns:p="http://schemas.openxmlformats.org/presentationml/2006/main">
   <p:cSld>
     <p:bg>
@@ -25897,17 +26595,17 @@
                   <a:schemeClr val="bg1"/>
                 </a:solidFill>
               </a:rPr>
-              <a:t>Reflection</a:t>
+              <a:t>Agenda</a:t>
             </a:r>
           </a:p>
         </p:txBody>
       </p:sp>
       <p:sp>
         <p:nvSpPr>
-          <p:cNvPr id="13" name="TextBox 12">
+          <p:cNvPr id="7" name="TextBox 6">
             <a:extLst>
               <a:ext uri="{FF2B5EF4-FFF2-40B4-BE49-F238E27FC236}">
-                <a16:creationId xmlns:a16="http://schemas.microsoft.com/office/drawing/2014/main" id="{1707AB87-08D1-423A-97D2-43AED4D4B26C}"/>
+                <a16:creationId xmlns:a16="http://schemas.microsoft.com/office/drawing/2014/main" id="{AC07530E-AE46-4151-B2C7-31747490FCCB}"/>
               </a:ext>
             </a:extLst>
           </p:cNvPr>
@@ -25916,8 +26614,8 @@
         </p:nvSpPr>
         <p:spPr>
           <a:xfrm>
-            <a:off x="968187" y="1054359"/>
-            <a:ext cx="10255626" cy="1200329"/>
+            <a:off x="890704" y="1208015"/>
+            <a:ext cx="10954551" cy="4415761"/>
           </a:xfrm>
           <a:prstGeom prst="rect">
             <a:avLst/>
@@ -25930,7 +26628,10 @@
           </a:bodyPr>
           <a:lstStyle/>
           <a:p>
-            <a:pPr marL="342900" indent="-342900">
+            <a:pPr marL="285750" indent="-285750">
+              <a:lnSpc>
+                <a:spcPct val="200000"/>
+              </a:lnSpc>
               <a:buFont typeface="Arial" panose="020B0604020202020204" pitchFamily="34" charset="0"/>
               <a:buChar char="•"/>
             </a:pPr>
@@ -25940,11 +26641,14 @@
                   <a:schemeClr val="bg1"/>
                 </a:solidFill>
               </a:rPr>
-              <a:t>What was one helpful thing?</a:t>
+              <a:t>Check-in</a:t>
             </a:r>
           </a:p>
           <a:p>
-            <a:pPr marL="342900" indent="-342900">
+            <a:pPr marL="285750" indent="-285750">
+              <a:lnSpc>
+                <a:spcPct val="200000"/>
+              </a:lnSpc>
               <a:buFont typeface="Arial" panose="020B0604020202020204" pitchFamily="34" charset="0"/>
               <a:buChar char="•"/>
             </a:pPr>
@@ -25954,11 +26658,14 @@
                   <a:schemeClr val="bg1"/>
                 </a:solidFill>
               </a:rPr>
-              <a:t>What was one not helpful thing?</a:t>
+              <a:t>Warm-up</a:t>
             </a:r>
           </a:p>
           <a:p>
-            <a:pPr marL="342900" indent="-342900">
+            <a:pPr marL="285750" indent="-285750">
+              <a:lnSpc>
+                <a:spcPct val="200000"/>
+              </a:lnSpc>
               <a:buFont typeface="Arial" panose="020B0604020202020204" pitchFamily="34" charset="0"/>
               <a:buChar char="•"/>
             </a:pPr>
@@ -25968,7 +26675,58 @@
                   <a:schemeClr val="bg1"/>
                 </a:solidFill>
               </a:rPr>
-              <a:t>What is one needed thing?</a:t>
+              <a:t>Discussion</a:t>
+            </a:r>
+          </a:p>
+          <a:p>
+            <a:pPr marL="285750" indent="-285750">
+              <a:lnSpc>
+                <a:spcPct val="200000"/>
+              </a:lnSpc>
+              <a:buFont typeface="Arial" panose="020B0604020202020204" pitchFamily="34" charset="0"/>
+              <a:buChar char="•"/>
+            </a:pPr>
+            <a:r>
+              <a:rPr lang="en-US" sz="2400" b="1" dirty="0">
+                <a:solidFill>
+                  <a:schemeClr val="bg1"/>
+                </a:solidFill>
+              </a:rPr>
+              <a:t>Working time</a:t>
+            </a:r>
+          </a:p>
+          <a:p>
+            <a:pPr marL="285750" indent="-285750">
+              <a:lnSpc>
+                <a:spcPct val="200000"/>
+              </a:lnSpc>
+              <a:buFont typeface="Arial" panose="020B0604020202020204" pitchFamily="34" charset="0"/>
+              <a:buChar char="•"/>
+            </a:pPr>
+            <a:r>
+              <a:rPr lang="en-US" sz="2400" b="1" dirty="0">
+                <a:solidFill>
+                  <a:schemeClr val="bg1"/>
+                </a:solidFill>
+              </a:rPr>
+              <a:t>Reflection</a:t>
+            </a:r>
+          </a:p>
+          <a:p>
+            <a:pPr marL="285750" indent="-285750">
+              <a:lnSpc>
+                <a:spcPct val="200000"/>
+              </a:lnSpc>
+              <a:buFont typeface="Arial" panose="020B0604020202020204" pitchFamily="34" charset="0"/>
+              <a:buChar char="•"/>
+            </a:pPr>
+            <a:r>
+              <a:rPr lang="en-US" sz="2400" b="1" dirty="0">
+                <a:solidFill>
+                  <a:schemeClr val="bg1"/>
+                </a:solidFill>
+              </a:rPr>
+              <a:t>Free-time</a:t>
             </a:r>
           </a:p>
         </p:txBody>
@@ -25976,7 +26734,7 @@
     </p:spTree>
     <p:extLst>
       <p:ext uri="{BB962C8B-B14F-4D97-AF65-F5344CB8AC3E}">
-        <p14:creationId xmlns:p14="http://schemas.microsoft.com/office/powerpoint/2010/main" val="1624190819"/>
+        <p14:creationId xmlns:p14="http://schemas.microsoft.com/office/powerpoint/2010/main" val="3200262478"/>
       </p:ext>
     </p:extLst>
   </p:cSld>
@@ -25986,7 +26744,7 @@
 </p:sld>
 </file>
 
-<file path=ppt/slides/slide2.xml><?xml version="1.0" encoding="utf-8"?>
+<file path=ppt/slides/slide20.xml><?xml version="1.0" encoding="utf-8"?>
 <p:sld xmlns:a="http://schemas.openxmlformats.org/drawingml/2006/main" xmlns:r="http://schemas.openxmlformats.org/officeDocument/2006/relationships" xmlns:p="http://schemas.openxmlformats.org/presentationml/2006/main">
   <p:cSld>
     <p:bg>
@@ -26633,17 +27391,17 @@
                   <a:schemeClr val="bg1"/>
                 </a:solidFill>
               </a:rPr>
-              <a:t>Agenda</a:t>
+              <a:t>Reflection</a:t>
             </a:r>
           </a:p>
         </p:txBody>
       </p:sp>
       <p:sp>
         <p:nvSpPr>
-          <p:cNvPr id="7" name="TextBox 6">
+          <p:cNvPr id="13" name="TextBox 12">
             <a:extLst>
               <a:ext uri="{FF2B5EF4-FFF2-40B4-BE49-F238E27FC236}">
-                <a16:creationId xmlns:a16="http://schemas.microsoft.com/office/drawing/2014/main" id="{AC07530E-AE46-4151-B2C7-31747490FCCB}"/>
+                <a16:creationId xmlns:a16="http://schemas.microsoft.com/office/drawing/2014/main" id="{1707AB87-08D1-423A-97D2-43AED4D4B26C}"/>
               </a:ext>
             </a:extLst>
           </p:cNvPr>
@@ -26652,8 +27410,8 @@
         </p:nvSpPr>
         <p:spPr>
           <a:xfrm>
-            <a:off x="890704" y="1208015"/>
-            <a:ext cx="10954551" cy="3677097"/>
+            <a:off x="968187" y="1054359"/>
+            <a:ext cx="10255626" cy="1200329"/>
           </a:xfrm>
           <a:prstGeom prst="rect">
             <a:avLst/>
@@ -26666,10 +27424,7 @@
           </a:bodyPr>
           <a:lstStyle/>
           <a:p>
-            <a:pPr marL="285750" indent="-285750">
-              <a:lnSpc>
-                <a:spcPct val="200000"/>
-              </a:lnSpc>
+            <a:pPr marL="342900" indent="-342900">
               <a:buFont typeface="Arial" panose="020B0604020202020204" pitchFamily="34" charset="0"/>
               <a:buChar char="•"/>
             </a:pPr>
@@ -26679,14 +27434,11 @@
                   <a:schemeClr val="bg1"/>
                 </a:solidFill>
               </a:rPr>
-              <a:t>Check-in</a:t>
+              <a:t>What was one helpful thing?</a:t>
             </a:r>
           </a:p>
           <a:p>
-            <a:pPr marL="285750" indent="-285750">
-              <a:lnSpc>
-                <a:spcPct val="200000"/>
-              </a:lnSpc>
+            <a:pPr marL="342900" indent="-342900">
               <a:buFont typeface="Arial" panose="020B0604020202020204" pitchFamily="34" charset="0"/>
               <a:buChar char="•"/>
             </a:pPr>
@@ -26696,14 +27448,11 @@
                   <a:schemeClr val="bg1"/>
                 </a:solidFill>
               </a:rPr>
-              <a:t>Warm-up</a:t>
+              <a:t>What was one not helpful thing?</a:t>
             </a:r>
           </a:p>
           <a:p>
-            <a:pPr marL="285750" indent="-285750">
-              <a:lnSpc>
-                <a:spcPct val="200000"/>
-              </a:lnSpc>
+            <a:pPr marL="342900" indent="-342900">
               <a:buFont typeface="Arial" panose="020B0604020202020204" pitchFamily="34" charset="0"/>
               <a:buChar char="•"/>
             </a:pPr>
@@ -26713,41 +27462,7 @@
                   <a:schemeClr val="bg1"/>
                 </a:solidFill>
               </a:rPr>
-              <a:t>Discussion</a:t>
-            </a:r>
-          </a:p>
-          <a:p>
-            <a:pPr marL="285750" indent="-285750">
-              <a:lnSpc>
-                <a:spcPct val="200000"/>
-              </a:lnSpc>
-              <a:buFont typeface="Arial" panose="020B0604020202020204" pitchFamily="34" charset="0"/>
-              <a:buChar char="•"/>
-            </a:pPr>
-            <a:r>
-              <a:rPr lang="en-US" sz="2400" b="1" dirty="0">
-                <a:solidFill>
-                  <a:schemeClr val="bg1"/>
-                </a:solidFill>
-              </a:rPr>
-              <a:t>Working time</a:t>
-            </a:r>
-          </a:p>
-          <a:p>
-            <a:pPr marL="285750" indent="-285750">
-              <a:lnSpc>
-                <a:spcPct val="200000"/>
-              </a:lnSpc>
-              <a:buFont typeface="Arial" panose="020B0604020202020204" pitchFamily="34" charset="0"/>
-              <a:buChar char="•"/>
-            </a:pPr>
-            <a:r>
-              <a:rPr lang="en-US" sz="2400" b="1" dirty="0">
-                <a:solidFill>
-                  <a:schemeClr val="bg1"/>
-                </a:solidFill>
-              </a:rPr>
-              <a:t>Free-hour</a:t>
+              <a:t>What is one needed thing?</a:t>
             </a:r>
           </a:p>
         </p:txBody>
@@ -26755,7 +27470,7 @@
     </p:spTree>
     <p:extLst>
       <p:ext uri="{BB962C8B-B14F-4D97-AF65-F5344CB8AC3E}">
-        <p14:creationId xmlns:p14="http://schemas.microsoft.com/office/powerpoint/2010/main" val="3200262478"/>
+        <p14:creationId xmlns:p14="http://schemas.microsoft.com/office/powerpoint/2010/main" val="1624190819"/>
       </p:ext>
     </p:extLst>
   </p:cSld>
@@ -28143,7 +28858,7 @@
         <p:spPr>
           <a:xfrm>
             <a:off x="1023457" y="1291905"/>
-            <a:ext cx="10393960" cy="1461106"/>
+            <a:ext cx="10393960" cy="3785652"/>
           </a:xfrm>
           <a:prstGeom prst="rect">
             <a:avLst/>
@@ -28188,6 +28903,128 @@
               </a:rPr>
               <a:t>Concerns?</a:t>
             </a:r>
+          </a:p>
+          <a:p>
+            <a:pPr marL="800100" lvl="1" indent="-342900">
+              <a:buFont typeface="Arial" panose="020B0604020202020204" pitchFamily="34" charset="0"/>
+              <a:buChar char="•"/>
+            </a:pPr>
+            <a:r>
+              <a:rPr lang="en-US" b="1" dirty="0">
+                <a:solidFill>
+                  <a:schemeClr val="bg1"/>
+                </a:solidFill>
+              </a:rPr>
+              <a:t>Animal training, no tour, animal care has now switched buildings</a:t>
+            </a:r>
+          </a:p>
+          <a:p>
+            <a:pPr marL="800100" lvl="1" indent="-342900">
+              <a:buFont typeface="Arial" panose="020B0604020202020204" pitchFamily="34" charset="0"/>
+              <a:buChar char="•"/>
+            </a:pPr>
+            <a:r>
+              <a:rPr lang="en-US" b="1" dirty="0">
+                <a:solidFill>
+                  <a:schemeClr val="bg1"/>
+                </a:solidFill>
+              </a:rPr>
+              <a:t>The training is frustrating and </a:t>
+            </a:r>
+            <a:r>
+              <a:rPr lang="en-US" b="1" dirty="0" err="1">
+                <a:solidFill>
+                  <a:schemeClr val="bg1"/>
+                </a:solidFill>
+              </a:rPr>
+              <a:t>kinda</a:t>
+            </a:r>
+            <a:r>
+              <a:rPr lang="en-US" b="1" dirty="0">
+                <a:solidFill>
+                  <a:schemeClr val="bg1"/>
+                </a:solidFill>
+              </a:rPr>
+              <a:t> all over the place</a:t>
+            </a:r>
+          </a:p>
+          <a:p>
+            <a:pPr marL="800100" lvl="1" indent="-342900">
+              <a:buFont typeface="Arial" panose="020B0604020202020204" pitchFamily="34" charset="0"/>
+              <a:buChar char="•"/>
+            </a:pPr>
+            <a:r>
+              <a:rPr lang="en-US" b="1" dirty="0">
+                <a:solidFill>
+                  <a:schemeClr val="bg1"/>
+                </a:solidFill>
+              </a:rPr>
+              <a:t>Much of the materials may not be there</a:t>
+            </a:r>
+          </a:p>
+          <a:p>
+            <a:pPr marL="800100" lvl="1" indent="-342900">
+              <a:buFont typeface="Arial" panose="020B0604020202020204" pitchFamily="34" charset="0"/>
+              <a:buChar char="•"/>
+            </a:pPr>
+            <a:r>
+              <a:rPr lang="en-US" b="1" dirty="0">
+                <a:solidFill>
+                  <a:schemeClr val="bg1"/>
+                </a:solidFill>
+              </a:rPr>
+              <a:t>ABRCMS: Naomi, Elizabeth, </a:t>
+            </a:r>
+          </a:p>
+          <a:p>
+            <a:pPr marL="800100" lvl="1" indent="-342900">
+              <a:buFont typeface="Arial" panose="020B0604020202020204" pitchFamily="34" charset="0"/>
+              <a:buChar char="•"/>
+            </a:pPr>
+            <a:r>
+              <a:rPr lang="en-US" b="1" dirty="0">
+                <a:solidFill>
+                  <a:schemeClr val="bg1"/>
+                </a:solidFill>
+              </a:rPr>
+              <a:t>Sabrina in the lab for this week (nano particle work)</a:t>
+            </a:r>
+          </a:p>
+          <a:p>
+            <a:pPr marL="800100" lvl="1" indent="-342900">
+              <a:buFont typeface="Arial" panose="020B0604020202020204" pitchFamily="34" charset="0"/>
+              <a:buChar char="•"/>
+            </a:pPr>
+            <a:r>
+              <a:rPr lang="en-US" b="1" dirty="0">
+                <a:solidFill>
+                  <a:schemeClr val="bg1"/>
+                </a:solidFill>
+              </a:rPr>
+              <a:t>Demi’s capstone project (augmented reality)</a:t>
+            </a:r>
+          </a:p>
+          <a:p>
+            <a:pPr marL="800100" lvl="1" indent="-342900">
+              <a:buFont typeface="Arial" panose="020B0604020202020204" pitchFamily="34" charset="0"/>
+              <a:buChar char="•"/>
+            </a:pPr>
+            <a:endParaRPr lang="en-US" b="1" dirty="0">
+              <a:solidFill>
+                <a:schemeClr val="bg1"/>
+              </a:solidFill>
+            </a:endParaRPr>
+          </a:p>
+          <a:p>
+            <a:pPr marL="800100" lvl="1" indent="-342900">
+              <a:buFont typeface="Arial" panose="020B0604020202020204" pitchFamily="34" charset="0"/>
+              <a:buChar char="•"/>
+            </a:pPr>
+            <a:endParaRPr lang="en-US" b="1" dirty="0">
+              <a:solidFill>
+                <a:schemeClr val="bg1"/>
+              </a:solidFill>
+            </a:endParaRPr>
           </a:p>
         </p:txBody>
       </p:sp>
@@ -28871,7 +29708,7 @@
         <p:spPr>
           <a:xfrm>
             <a:off x="1023457" y="1291905"/>
-            <a:ext cx="10393960" cy="2199769"/>
+            <a:ext cx="10393960" cy="4415761"/>
           </a:xfrm>
           <a:prstGeom prst="rect">
             <a:avLst/>
@@ -28932,6 +29769,57 @@
                 </a:solidFill>
               </a:rPr>
               <a:t>What grad school or SRE seminars have you attended? Take-aways?</a:t>
+            </a:r>
+          </a:p>
+          <a:p>
+            <a:pPr marL="800100" lvl="1" indent="-342900">
+              <a:lnSpc>
+                <a:spcPct val="200000"/>
+              </a:lnSpc>
+              <a:buFont typeface="Arial" panose="020B0604020202020204" pitchFamily="34" charset="0"/>
+              <a:buChar char="•"/>
+            </a:pPr>
+            <a:r>
+              <a:rPr lang="en-US" sz="2400" b="1" dirty="0">
+                <a:solidFill>
+                  <a:schemeClr val="bg1"/>
+                </a:solidFill>
+              </a:rPr>
+              <a:t>INBRE grad session</a:t>
+            </a:r>
+          </a:p>
+          <a:p>
+            <a:pPr marL="800100" lvl="1" indent="-342900">
+              <a:lnSpc>
+                <a:spcPct val="200000"/>
+              </a:lnSpc>
+              <a:buFont typeface="Arial" panose="020B0604020202020204" pitchFamily="34" charset="0"/>
+              <a:buChar char="•"/>
+            </a:pPr>
+            <a:r>
+              <a:rPr lang="en-US" sz="2400" b="1" dirty="0">
+                <a:solidFill>
+                  <a:schemeClr val="bg1"/>
+                </a:solidFill>
+              </a:rPr>
+              <a:t>A lot of helpful things but some </a:t>
+            </a:r>
+          </a:p>
+          <a:p>
+            <a:pPr marL="800100" lvl="1" indent="-342900">
+              <a:lnSpc>
+                <a:spcPct val="200000"/>
+              </a:lnSpc>
+              <a:buFont typeface="Arial" panose="020B0604020202020204" pitchFamily="34" charset="0"/>
+              <a:buChar char="•"/>
+            </a:pPr>
+            <a:r>
+              <a:rPr lang="en-US" sz="2400" b="1" dirty="0">
+                <a:solidFill>
+                  <a:schemeClr val="bg1"/>
+                </a:solidFill>
+              </a:rPr>
+              <a:t>More in depth? (seen statistics, demographics, </a:t>
             </a:r>
           </a:p>
         </p:txBody>
@@ -29616,7 +30504,7 @@
         <p:spPr>
           <a:xfrm>
             <a:off x="968187" y="1054359"/>
-            <a:ext cx="10255626" cy="2938433"/>
+            <a:ext cx="10255626" cy="4046429"/>
           </a:xfrm>
           <a:prstGeom prst="rect">
             <a:avLst/>
@@ -29647,9 +30535,6 @@
           </a:p>
           <a:p>
             <a:pPr marL="742950" lvl="1" indent="-285750">
-              <a:lnSpc>
-                <a:spcPct val="200000"/>
-              </a:lnSpc>
               <a:buFont typeface="Arial" panose="020B0604020202020204" pitchFamily="34" charset="0"/>
               <a:buChar char="•"/>
             </a:pPr>
@@ -29659,7 +30544,7 @@
                   <a:schemeClr val="bg1"/>
                 </a:solidFill>
               </a:rPr>
-              <a:t>Double-dipping for SRE’s</a:t>
+              <a:t>Double-dipping for SRE’s (MARC trainees are funded year-round, you cannot accept any money from those programs, best strategy: look at the places you want to go to graduate school)</a:t>
             </a:r>
           </a:p>
           <a:p>
@@ -29676,8 +30561,22 @@
                   <a:schemeClr val="bg1"/>
                 </a:solidFill>
               </a:rPr>
-              <a:t>Who from MARC to include on emails for SRE?</a:t>
+              <a:t>Who from MARC to include on emails for SRE? (Niall and Bryan)</a:t>
             </a:r>
+          </a:p>
+          <a:p>
+            <a:pPr marL="742950" lvl="1" indent="-285750">
+              <a:lnSpc>
+                <a:spcPct val="200000"/>
+              </a:lnSpc>
+              <a:buFont typeface="Arial" panose="020B0604020202020204" pitchFamily="34" charset="0"/>
+              <a:buChar char="•"/>
+            </a:pPr>
+            <a:endParaRPr lang="en-US" sz="2400" b="1" dirty="0">
+              <a:solidFill>
+                <a:schemeClr val="bg1"/>
+              </a:solidFill>
+            </a:endParaRPr>
           </a:p>
           <a:p>
             <a:pPr marL="742950" lvl="1" indent="-285750">

</xml_diff>